<commit_message>
Collection and Map interface
</commit_message>
<xml_diff>
--- a/14_01_13_CollectionGeneric/ch1402_CollectionGenericPractical/1402_CollectionGenericPractical.pptx
+++ b/14_01_13_CollectionGeneric/ch1402_CollectionGenericPractical/1402_CollectionGenericPractical.pptx
@@ -5,23 +5,22 @@
     <p:sldMasterId id="2147483648" r:id="rId1"/>
   </p:sldMasterIdLst>
   <p:notesMasterIdLst>
-    <p:notesMasterId r:id="rId16"/>
+    <p:notesMasterId r:id="rId15"/>
   </p:notesMasterIdLst>
   <p:sldIdLst>
     <p:sldId id="256" r:id="rId2"/>
     <p:sldId id="260" r:id="rId3"/>
     <p:sldId id="261" r:id="rId4"/>
     <p:sldId id="262" r:id="rId5"/>
-    <p:sldId id="264" r:id="rId6"/>
-    <p:sldId id="263" r:id="rId7"/>
-    <p:sldId id="265" r:id="rId8"/>
-    <p:sldId id="268" r:id="rId9"/>
-    <p:sldId id="266" r:id="rId10"/>
-    <p:sldId id="267" r:id="rId11"/>
-    <p:sldId id="269" r:id="rId12"/>
-    <p:sldId id="270" r:id="rId13"/>
-    <p:sldId id="271" r:id="rId14"/>
-    <p:sldId id="259" r:id="rId15"/>
+    <p:sldId id="263" r:id="rId6"/>
+    <p:sldId id="265" r:id="rId7"/>
+    <p:sldId id="268" r:id="rId8"/>
+    <p:sldId id="266" r:id="rId9"/>
+    <p:sldId id="267" r:id="rId10"/>
+    <p:sldId id="269" r:id="rId11"/>
+    <p:sldId id="270" r:id="rId12"/>
+    <p:sldId id="271" r:id="rId13"/>
+    <p:sldId id="259" r:id="rId14"/>
   </p:sldIdLst>
   <p:sldSz cx="9144000" cy="6858000" type="screen4x3"/>
   <p:notesSz cx="6858000" cy="9144000"/>
@@ -3611,439 +3610,6 @@
           <a:chExt cx="0" cy="0"/>
         </a:xfrm>
       </p:grpSpPr>
-      <p:pic>
-        <p:nvPicPr>
-          <p:cNvPr id="7" name="Picture 6">
-            <a:extLst>
-              <a:ext uri="{FF2B5EF4-FFF2-40B4-BE49-F238E27FC236}">
-                <a16:creationId xmlns:a16="http://schemas.microsoft.com/office/drawing/2014/main" id="{C5E29281-308C-44D3-8E4A-AB074B879039}"/>
-              </a:ext>
-            </a:extLst>
-          </p:cNvPr>
-          <p:cNvPicPr>
-            <a:picLocks noChangeAspect="1"/>
-          </p:cNvPicPr>
-          <p:nvPr/>
-        </p:nvPicPr>
-        <p:blipFill>
-          <a:blip r:embed="rId2"/>
-          <a:stretch>
-            <a:fillRect/>
-          </a:stretch>
-        </p:blipFill>
-        <p:spPr>
-          <a:xfrm>
-            <a:off x="2051720" y="1882376"/>
-            <a:ext cx="3852428" cy="4669110"/>
-          </a:xfrm>
-          <a:prstGeom prst="rect">
-            <a:avLst/>
-          </a:prstGeom>
-          <a:ln>
-            <a:solidFill>
-              <a:srgbClr val="C00000"/>
-            </a:solidFill>
-          </a:ln>
-        </p:spPr>
-      </p:pic>
-      <p:sp>
-        <p:nvSpPr>
-          <p:cNvPr id="2" name="標題 1"/>
-          <p:cNvSpPr>
-            <a:spLocks noGrp="1"/>
-          </p:cNvSpPr>
-          <p:nvPr>
-            <p:ph type="ctrTitle"/>
-          </p:nvPr>
-        </p:nvSpPr>
-        <p:spPr>
-          <a:xfrm>
-            <a:off x="0" y="1"/>
-            <a:ext cx="9144000" cy="764704"/>
-          </a:xfrm>
-          <a:gradFill flip="none" rotWithShape="1">
-            <a:gsLst>
-              <a:gs pos="0">
-                <a:srgbClr val="C00000">
-                  <a:shade val="30000"/>
-                  <a:satMod val="115000"/>
-                </a:srgbClr>
-              </a:gs>
-              <a:gs pos="50000">
-                <a:srgbClr val="C00000">
-                  <a:shade val="67500"/>
-                  <a:satMod val="115000"/>
-                </a:srgbClr>
-              </a:gs>
-              <a:gs pos="100000">
-                <a:srgbClr val="C00000">
-                  <a:shade val="100000"/>
-                  <a:satMod val="115000"/>
-                </a:srgbClr>
-              </a:gs>
-            </a:gsLst>
-            <a:path path="circle">
-              <a:fillToRect t="100000" r="100000"/>
-            </a:path>
-            <a:tileRect l="-100000" b="-100000"/>
-          </a:gradFill>
-        </p:spPr>
-        <p:txBody>
-          <a:bodyPr>
-            <a:normAutofit/>
-          </a:bodyPr>
-          <a:lstStyle/>
-          <a:p>
-            <a:pPr algn="l"/>
-            <a:r>
-              <a:rPr lang="en-US" altLang="zh-TW" b="1" dirty="0">
-                <a:solidFill>
-                  <a:srgbClr val="FFFF00"/>
-                </a:solidFill>
-              </a:rPr>
-              <a:t>14.02.01 Loop Objects by Iterator</a:t>
-            </a:r>
-            <a:endParaRPr lang="zh-TW" altLang="en-US" b="1" dirty="0">
-              <a:solidFill>
-                <a:srgbClr val="FFFF00"/>
-              </a:solidFill>
-            </a:endParaRPr>
-          </a:p>
-        </p:txBody>
-      </p:sp>
-      <p:sp>
-        <p:nvSpPr>
-          <p:cNvPr id="3" name="副標題 2"/>
-          <p:cNvSpPr>
-            <a:spLocks noGrp="1"/>
-          </p:cNvSpPr>
-          <p:nvPr>
-            <p:ph type="subTitle" idx="1"/>
-          </p:nvPr>
-        </p:nvSpPr>
-        <p:spPr>
-          <a:xfrm>
-            <a:off x="467544" y="1268760"/>
-            <a:ext cx="8352928" cy="469600"/>
-          </a:xfrm>
-          <a:ln>
-            <a:solidFill>
-              <a:srgbClr val="C00000"/>
-            </a:solidFill>
-          </a:ln>
-        </p:spPr>
-        <p:txBody>
-          <a:bodyPr>
-            <a:noAutofit/>
-          </a:bodyPr>
-          <a:lstStyle/>
-          <a:p>
-            <a:pPr marL="342900" indent="-342900" algn="l">
-              <a:buClr>
-                <a:srgbClr val="0070C0"/>
-              </a:buClr>
-              <a:buSzPct val="80000"/>
-              <a:buFont typeface="Wingdings" pitchFamily="2" charset="2"/>
-              <a:buChar char="u"/>
-            </a:pPr>
-            <a:r>
-              <a:rPr lang="en-US" altLang="zh-TW" sz="1600" dirty="0">
-                <a:solidFill>
-                  <a:schemeClr val="tx1"/>
-                </a:solidFill>
-              </a:rPr>
-              <a:t>Use while (</a:t>
-            </a:r>
-            <a:r>
-              <a:rPr lang="en-US" altLang="zh-TW" sz="1600" dirty="0" err="1">
-                <a:solidFill>
-                  <a:schemeClr val="tx1"/>
-                </a:solidFill>
-              </a:rPr>
-              <a:t>i.hasNext</a:t>
-            </a:r>
-            <a:r>
-              <a:rPr lang="en-US" altLang="zh-TW" sz="1600" dirty="0">
-                <a:solidFill>
-                  <a:schemeClr val="tx1"/>
-                </a:solidFill>
-              </a:rPr>
-              <a:t>()) to loop all the elements and print with </a:t>
-            </a:r>
-            <a:r>
-              <a:rPr lang="en-US" altLang="zh-TW" sz="1600" dirty="0" err="1">
-                <a:solidFill>
-                  <a:schemeClr val="tx1"/>
-                </a:solidFill>
-              </a:rPr>
-              <a:t>i.next</a:t>
-            </a:r>
-            <a:r>
-              <a:rPr lang="en-US" altLang="zh-TW" sz="1600" dirty="0">
-                <a:solidFill>
-                  <a:schemeClr val="tx1"/>
-                </a:solidFill>
-              </a:rPr>
-              <a:t>().</a:t>
-            </a:r>
-          </a:p>
-        </p:txBody>
-      </p:sp>
-      <p:sp>
-        <p:nvSpPr>
-          <p:cNvPr id="4" name="標題 1"/>
-          <p:cNvSpPr txBox="1">
-            <a:spLocks/>
-          </p:cNvSpPr>
-          <p:nvPr/>
-        </p:nvSpPr>
-        <p:spPr>
-          <a:xfrm>
-            <a:off x="0" y="764704"/>
-            <a:ext cx="9144000" cy="360040"/>
-          </a:xfrm>
-          <a:prstGeom prst="rect">
-            <a:avLst/>
-          </a:prstGeom>
-          <a:gradFill flip="none" rotWithShape="1">
-            <a:gsLst>
-              <a:gs pos="0">
-                <a:srgbClr val="00B0F0">
-                  <a:shade val="30000"/>
-                  <a:satMod val="115000"/>
-                </a:srgbClr>
-              </a:gs>
-              <a:gs pos="50000">
-                <a:srgbClr val="00B0F0">
-                  <a:shade val="67500"/>
-                  <a:satMod val="115000"/>
-                </a:srgbClr>
-              </a:gs>
-              <a:gs pos="100000">
-                <a:srgbClr val="00B0F0">
-                  <a:shade val="100000"/>
-                  <a:satMod val="115000"/>
-                </a:srgbClr>
-              </a:gs>
-            </a:gsLst>
-            <a:path path="circle">
-              <a:fillToRect t="100000" r="100000"/>
-            </a:path>
-            <a:tileRect l="-100000" b="-100000"/>
-          </a:gradFill>
-        </p:spPr>
-        <p:txBody>
-          <a:bodyPr vert="horz" lIns="91440" tIns="45720" rIns="91440" bIns="45720" rtlCol="0" anchor="ctr">
-            <a:normAutofit fontScale="92500"/>
-          </a:bodyPr>
-          <a:lstStyle/>
-          <a:p>
-            <a:pPr lvl="0">
-              <a:spcBef>
-                <a:spcPct val="0"/>
-              </a:spcBef>
-            </a:pPr>
-            <a:r>
-              <a:rPr lang="en-US" altLang="zh-TW" sz="1600" dirty="0">
-                <a:latin typeface="+mj-lt"/>
-                <a:ea typeface="+mj-ea"/>
-                <a:cs typeface="+mj-cs"/>
-              </a:rPr>
-              <a:t>https://www.youtube.com/watch?v=HhrQqmp3hXI&amp;list=PLsyeobzWxl7oZ-fxDYkOToURHhMuWD1BK&amp;index=133</a:t>
-            </a:r>
-            <a:endParaRPr kumimoji="0" lang="zh-TW" altLang="en-US" sz="1600" b="0" i="0" u="none" strike="noStrike" kern="1200" cap="none" spc="0" normalizeH="0" baseline="0" noProof="0" dirty="0">
-              <a:ln>
-                <a:noFill/>
-              </a:ln>
-              <a:solidFill>
-                <a:schemeClr val="tx1"/>
-              </a:solidFill>
-              <a:effectLst/>
-              <a:uLnTx/>
-              <a:uFillTx/>
-              <a:latin typeface="+mj-lt"/>
-              <a:ea typeface="+mj-ea"/>
-              <a:cs typeface="+mj-cs"/>
-            </a:endParaRPr>
-          </a:p>
-        </p:txBody>
-      </p:sp>
-      <p:sp>
-        <p:nvSpPr>
-          <p:cNvPr id="5" name="日期版面配置區 4"/>
-          <p:cNvSpPr>
-            <a:spLocks noGrp="1"/>
-          </p:cNvSpPr>
-          <p:nvPr>
-            <p:ph type="dt" sz="half" idx="10"/>
-          </p:nvPr>
-        </p:nvSpPr>
-        <p:spPr/>
-        <p:txBody>
-          <a:bodyPr/>
-          <a:lstStyle/>
-          <a:p>
-            <a:fld id="{A4F910E6-8D00-4BAF-8C48-9688E0B449D3}" type="datetime1">
-              <a:rPr lang="zh-TW" altLang="en-US" smtClean="0"/>
-              <a:pPr/>
-              <a:t>2019/3/20</a:t>
-            </a:fld>
-            <a:endParaRPr lang="zh-TW" altLang="en-US"/>
-          </a:p>
-        </p:txBody>
-      </p:sp>
-      <p:sp>
-        <p:nvSpPr>
-          <p:cNvPr id="6" name="投影片編號版面配置區 5"/>
-          <p:cNvSpPr>
-            <a:spLocks noGrp="1"/>
-          </p:cNvSpPr>
-          <p:nvPr>
-            <p:ph type="sldNum" sz="quarter" idx="12"/>
-          </p:nvPr>
-        </p:nvSpPr>
-        <p:spPr/>
-        <p:txBody>
-          <a:bodyPr/>
-          <a:lstStyle/>
-          <a:p>
-            <a:fld id="{E4D7E63D-91F2-4366-A2C4-1B00C9E2590E}" type="slidenum">
-              <a:rPr lang="zh-TW" altLang="en-US" smtClean="0"/>
-              <a:pPr/>
-              <a:t>10</a:t>
-            </a:fld>
-            <a:endParaRPr lang="zh-TW" altLang="en-US"/>
-          </a:p>
-        </p:txBody>
-      </p:sp>
-      <p:sp>
-        <p:nvSpPr>
-          <p:cNvPr id="129" name="Rectangle 128">
-            <a:extLst>
-              <a:ext uri="{FF2B5EF4-FFF2-40B4-BE49-F238E27FC236}">
-                <a16:creationId xmlns:a16="http://schemas.microsoft.com/office/drawing/2014/main" id="{9F68A035-546B-4E11-ADFC-7FBDDAC42022}"/>
-              </a:ext>
-            </a:extLst>
-          </p:cNvPr>
-          <p:cNvSpPr/>
-          <p:nvPr/>
-        </p:nvSpPr>
-        <p:spPr>
-          <a:xfrm>
-            <a:off x="2771800" y="4581128"/>
-            <a:ext cx="2304256" cy="576064"/>
-          </a:xfrm>
-          <a:prstGeom prst="rect">
-            <a:avLst/>
-          </a:prstGeom>
-          <a:noFill/>
-          <a:ln>
-            <a:solidFill>
-              <a:srgbClr val="C00000"/>
-            </a:solidFill>
-          </a:ln>
-        </p:spPr>
-        <p:style>
-          <a:lnRef idx="2">
-            <a:schemeClr val="accent1">
-              <a:shade val="50000"/>
-            </a:schemeClr>
-          </a:lnRef>
-          <a:fillRef idx="1">
-            <a:schemeClr val="accent1"/>
-          </a:fillRef>
-          <a:effectRef idx="0">
-            <a:schemeClr val="accent1"/>
-          </a:effectRef>
-          <a:fontRef idx="minor">
-            <a:schemeClr val="lt1"/>
-          </a:fontRef>
-        </p:style>
-        <p:txBody>
-          <a:bodyPr rtlCol="0" anchor="ctr"/>
-          <a:lstStyle/>
-          <a:p>
-            <a:pPr algn="ctr"/>
-            <a:endParaRPr lang="en-US"/>
-          </a:p>
-        </p:txBody>
-      </p:sp>
-      <p:cxnSp>
-        <p:nvCxnSpPr>
-          <p:cNvPr id="131" name="Straight Arrow Connector 130">
-            <a:extLst>
-              <a:ext uri="{FF2B5EF4-FFF2-40B4-BE49-F238E27FC236}">
-                <a16:creationId xmlns:a16="http://schemas.microsoft.com/office/drawing/2014/main" id="{70BAF35F-69E8-4346-86B2-726DF28197E9}"/>
-              </a:ext>
-            </a:extLst>
-          </p:cNvPr>
-          <p:cNvCxnSpPr>
-            <a:cxnSpLocks/>
-            <a:stCxn id="3" idx="2"/>
-            <a:endCxn id="129" idx="0"/>
-          </p:cNvCxnSpPr>
-          <p:nvPr/>
-        </p:nvCxnSpPr>
-        <p:spPr>
-          <a:xfrm flipH="1">
-            <a:off x="3923928" y="1738360"/>
-            <a:ext cx="720080" cy="2842768"/>
-          </a:xfrm>
-          <a:prstGeom prst="straightConnector1">
-            <a:avLst/>
-          </a:prstGeom>
-          <a:ln>
-            <a:solidFill>
-              <a:srgbClr val="C00000"/>
-            </a:solidFill>
-            <a:tailEnd type="triangle"/>
-          </a:ln>
-        </p:spPr>
-        <p:style>
-          <a:lnRef idx="1">
-            <a:schemeClr val="accent1"/>
-          </a:lnRef>
-          <a:fillRef idx="0">
-            <a:schemeClr val="accent1"/>
-          </a:fillRef>
-          <a:effectRef idx="0">
-            <a:schemeClr val="accent1"/>
-          </a:effectRef>
-          <a:fontRef idx="minor">
-            <a:schemeClr val="tx1"/>
-          </a:fontRef>
-        </p:style>
-      </p:cxnSp>
-    </p:spTree>
-    <p:extLst>
-      <p:ext uri="{BB962C8B-B14F-4D97-AF65-F5344CB8AC3E}">
-        <p14:creationId xmlns:p14="http://schemas.microsoft.com/office/powerpoint/2010/main" val="166083836"/>
-      </p:ext>
-    </p:extLst>
-  </p:cSld>
-  <p:clrMapOvr>
-    <a:masterClrMapping/>
-  </p:clrMapOvr>
-</p:sld>
-</file>
-
-<file path=ppt/slides/slide11.xml><?xml version="1.0" encoding="utf-8"?>
-<p:sld xmlns:a="http://schemas.openxmlformats.org/drawingml/2006/main" xmlns:r="http://schemas.openxmlformats.org/officeDocument/2006/relationships" xmlns:p="http://schemas.openxmlformats.org/presentationml/2006/main">
-  <p:cSld>
-    <p:spTree>
-      <p:nvGrpSpPr>
-        <p:cNvPr id="1" name=""/>
-        <p:cNvGrpSpPr/>
-        <p:nvPr/>
-      </p:nvGrpSpPr>
-      <p:grpSpPr>
-        <a:xfrm>
-          <a:off x="0" y="0"/>
-          <a:ext cx="0" cy="0"/>
-          <a:chOff x="0" y="0"/>
-          <a:chExt cx="0" cy="0"/>
-        </a:xfrm>
-      </p:grpSpPr>
       <p:sp>
         <p:nvSpPr>
           <p:cNvPr id="2" name="標題 1"/>
@@ -4157,7 +3723,7 @@
             <a:fld id="{E4D7E63D-91F2-4366-A2C4-1B00C9E2590E}" type="slidenum">
               <a:rPr lang="zh-TW" altLang="en-US" smtClean="0"/>
               <a:pPr/>
-              <a:t>11</a:t>
+              <a:t>10</a:t>
             </a:fld>
             <a:endParaRPr lang="zh-TW" altLang="en-US"/>
           </a:p>
@@ -4208,7 +3774,7 @@
 </p:sld>
 </file>
 
-<file path=ppt/slides/slide12.xml><?xml version="1.0" encoding="utf-8"?>
+<file path=ppt/slides/slide11.xml><?xml version="1.0" encoding="utf-8"?>
 <p:sld xmlns:a="http://schemas.openxmlformats.org/drawingml/2006/main" xmlns:r="http://schemas.openxmlformats.org/officeDocument/2006/relationships" xmlns:p="http://schemas.openxmlformats.org/presentationml/2006/main">
   <p:cSld>
     <p:spTree>
@@ -4628,7 +4194,7 @@
             <a:fld id="{E4D7E63D-91F2-4366-A2C4-1B00C9E2590E}" type="slidenum">
               <a:rPr lang="zh-TW" altLang="en-US" smtClean="0"/>
               <a:pPr/>
-              <a:t>12</a:t>
+              <a:t>11</a:t>
             </a:fld>
             <a:endParaRPr lang="zh-TW" altLang="en-US"/>
           </a:p>
@@ -4744,7 +4310,7 @@
 </p:sld>
 </file>
 
-<file path=ppt/slides/slide13.xml><?xml version="1.0" encoding="utf-8"?>
+<file path=ppt/slides/slide12.xml><?xml version="1.0" encoding="utf-8"?>
 <p:sld xmlns:a="http://schemas.openxmlformats.org/drawingml/2006/main" xmlns:r="http://schemas.openxmlformats.org/officeDocument/2006/relationships" xmlns:p="http://schemas.openxmlformats.org/presentationml/2006/main">
   <p:cSld>
     <p:spTree>
@@ -5025,7 +4591,7 @@
             <a:fld id="{E4D7E63D-91F2-4366-A2C4-1B00C9E2590E}" type="slidenum">
               <a:rPr lang="zh-TW" altLang="en-US" smtClean="0"/>
               <a:pPr/>
-              <a:t>13</a:t>
+              <a:t>12</a:t>
             </a:fld>
             <a:endParaRPr lang="zh-TW" altLang="en-US"/>
           </a:p>
@@ -5142,7 +4708,7 @@
 </p:sld>
 </file>
 
-<file path=ppt/slides/slide14.xml><?xml version="1.0" encoding="utf-8"?>
+<file path=ppt/slides/slide13.xml><?xml version="1.0" encoding="utf-8"?>
 <p:sld xmlns:a="http://schemas.openxmlformats.org/drawingml/2006/main" xmlns:r="http://schemas.openxmlformats.org/officeDocument/2006/relationships" xmlns:p="http://schemas.openxmlformats.org/presentationml/2006/main">
   <p:cSld>
     <p:spTree>
@@ -5265,7 +4831,7 @@
             <a:fld id="{E4D7E63D-91F2-4366-A2C4-1B00C9E2590E}" type="slidenum">
               <a:rPr lang="zh-TW" altLang="en-US" smtClean="0"/>
               <a:pPr/>
-              <a:t>14</a:t>
+              <a:t>13</a:t>
             </a:fld>
             <a:endParaRPr lang="zh-TW" altLang="en-US"/>
           </a:p>
@@ -6062,41 +5628,6 @@
           <a:chExt cx="0" cy="0"/>
         </a:xfrm>
       </p:grpSpPr>
-      <p:pic>
-        <p:nvPicPr>
-          <p:cNvPr id="14" name="Picture 13">
-            <a:extLst>
-              <a:ext uri="{FF2B5EF4-FFF2-40B4-BE49-F238E27FC236}">
-                <a16:creationId xmlns:a16="http://schemas.microsoft.com/office/drawing/2014/main" id="{E7A96C24-86CA-4BEF-B3D8-4C5D79D7D2DC}"/>
-              </a:ext>
-            </a:extLst>
-          </p:cNvPr>
-          <p:cNvPicPr>
-            <a:picLocks noChangeAspect="1"/>
-          </p:cNvPicPr>
-          <p:nvPr/>
-        </p:nvPicPr>
-        <p:blipFill>
-          <a:blip r:embed="rId2"/>
-          <a:stretch>
-            <a:fillRect/>
-          </a:stretch>
-        </p:blipFill>
-        <p:spPr>
-          <a:xfrm>
-            <a:off x="3752665" y="3480494"/>
-            <a:ext cx="5077479" cy="2493218"/>
-          </a:xfrm>
-          <a:prstGeom prst="rect">
-            <a:avLst/>
-          </a:prstGeom>
-          <a:ln>
-            <a:solidFill>
-              <a:srgbClr val="C00000"/>
-            </a:solidFill>
-          </a:ln>
-        </p:spPr>
-      </p:pic>
       <p:sp>
         <p:nvSpPr>
           <p:cNvPr id="2" name="標題 1"/>
@@ -6203,7 +5734,7 @@
                   <a:schemeClr val="tx1"/>
                 </a:solidFill>
               </a:rPr>
-              <a:t>Google “Collection API in Java”.</a:t>
+              <a:t>Google “Collection API in Java” and “Map Interface in Java”.</a:t>
             </a:r>
           </a:p>
         </p:txBody>
@@ -6337,10 +5868,45 @@
       </p:sp>
       <p:pic>
         <p:nvPicPr>
-          <p:cNvPr id="12" name="Picture 11">
+          <p:cNvPr id="8" name="Picture 7">
             <a:extLst>
               <a:ext uri="{FF2B5EF4-FFF2-40B4-BE49-F238E27FC236}">
-                <a16:creationId xmlns:a16="http://schemas.microsoft.com/office/drawing/2014/main" id="{43691173-D047-4CB3-8588-8C751F8AA111}"/>
+                <a16:creationId xmlns:a16="http://schemas.microsoft.com/office/drawing/2014/main" id="{48DE8EF4-1378-4730-9DEB-780EE48D8982}"/>
+              </a:ext>
+            </a:extLst>
+          </p:cNvPr>
+          <p:cNvPicPr>
+            <a:picLocks noChangeAspect="1"/>
+          </p:cNvPicPr>
+          <p:nvPr/>
+        </p:nvPicPr>
+        <p:blipFill>
+          <a:blip r:embed="rId2"/>
+          <a:stretch>
+            <a:fillRect/>
+          </a:stretch>
+        </p:blipFill>
+        <p:spPr>
+          <a:xfrm>
+            <a:off x="457200" y="2031631"/>
+            <a:ext cx="4413031" cy="3109732"/>
+          </a:xfrm>
+          <a:prstGeom prst="rect">
+            <a:avLst/>
+          </a:prstGeom>
+          <a:ln>
+            <a:solidFill>
+              <a:srgbClr val="C00000"/>
+            </a:solidFill>
+          </a:ln>
+        </p:spPr>
+      </p:pic>
+      <p:pic>
+        <p:nvPicPr>
+          <p:cNvPr id="9" name="Picture 8">
+            <a:extLst>
+              <a:ext uri="{FF2B5EF4-FFF2-40B4-BE49-F238E27FC236}">
+                <a16:creationId xmlns:a16="http://schemas.microsoft.com/office/drawing/2014/main" id="{3897D56B-F846-44ED-8B72-18EE2572B624}"/>
               </a:ext>
             </a:extLst>
           </p:cNvPr>
@@ -6357,8 +5923,8 @@
         </p:blipFill>
         <p:spPr>
           <a:xfrm>
-            <a:off x="539552" y="1750045"/>
-            <a:ext cx="2745617" cy="3460899"/>
+            <a:off x="5090649" y="2031631"/>
+            <a:ext cx="3729823" cy="2697753"/>
           </a:xfrm>
           <a:prstGeom prst="rect">
             <a:avLst/>
@@ -6370,103 +5936,6 @@
           </a:ln>
         </p:spPr>
       </p:pic>
-      <p:sp>
-        <p:nvSpPr>
-          <p:cNvPr id="13" name="Rectangle 12">
-            <a:extLst>
-              <a:ext uri="{FF2B5EF4-FFF2-40B4-BE49-F238E27FC236}">
-                <a16:creationId xmlns:a16="http://schemas.microsoft.com/office/drawing/2014/main" id="{BE35145C-4D91-4FC1-96F8-A9CEE5B0B36D}"/>
-              </a:ext>
-            </a:extLst>
-          </p:cNvPr>
-          <p:cNvSpPr/>
-          <p:nvPr/>
-        </p:nvSpPr>
-        <p:spPr>
-          <a:xfrm>
-            <a:off x="1691680" y="4217151"/>
-            <a:ext cx="1593489" cy="969730"/>
-          </a:xfrm>
-          <a:prstGeom prst="rect">
-            <a:avLst/>
-          </a:prstGeom>
-          <a:noFill/>
-          <a:ln>
-            <a:solidFill>
-              <a:srgbClr val="C00000"/>
-            </a:solidFill>
-          </a:ln>
-        </p:spPr>
-        <p:style>
-          <a:lnRef idx="2">
-            <a:schemeClr val="accent1">
-              <a:shade val="50000"/>
-            </a:schemeClr>
-          </a:lnRef>
-          <a:fillRef idx="1">
-            <a:schemeClr val="accent1"/>
-          </a:fillRef>
-          <a:effectRef idx="0">
-            <a:schemeClr val="accent1"/>
-          </a:effectRef>
-          <a:fontRef idx="minor">
-            <a:schemeClr val="lt1"/>
-          </a:fontRef>
-        </p:style>
-        <p:txBody>
-          <a:bodyPr rtlCol="0" anchor="ctr"/>
-          <a:lstStyle/>
-          <a:p>
-            <a:pPr algn="ctr"/>
-            <a:endParaRPr lang="en-US"/>
-          </a:p>
-        </p:txBody>
-      </p:sp>
-      <p:cxnSp>
-        <p:nvCxnSpPr>
-          <p:cNvPr id="16" name="Straight Arrow Connector 15">
-            <a:extLst>
-              <a:ext uri="{FF2B5EF4-FFF2-40B4-BE49-F238E27FC236}">
-                <a16:creationId xmlns:a16="http://schemas.microsoft.com/office/drawing/2014/main" id="{D72182A1-CBAA-43D2-B31E-F8DFDDA9DF8D}"/>
-              </a:ext>
-            </a:extLst>
-          </p:cNvPr>
-          <p:cNvCxnSpPr>
-            <a:stCxn id="13" idx="3"/>
-            <a:endCxn id="14" idx="1"/>
-          </p:cNvCxnSpPr>
-          <p:nvPr/>
-        </p:nvCxnSpPr>
-        <p:spPr>
-          <a:xfrm>
-            <a:off x="3285169" y="4702016"/>
-            <a:ext cx="467496" cy="25087"/>
-          </a:xfrm>
-          <a:prstGeom prst="straightConnector1">
-            <a:avLst/>
-          </a:prstGeom>
-          <a:ln>
-            <a:solidFill>
-              <a:srgbClr val="C00000"/>
-            </a:solidFill>
-            <a:tailEnd type="triangle"/>
-          </a:ln>
-        </p:spPr>
-        <p:style>
-          <a:lnRef idx="1">
-            <a:schemeClr val="accent1"/>
-          </a:lnRef>
-          <a:fillRef idx="0">
-            <a:schemeClr val="accent1"/>
-          </a:fillRef>
-          <a:effectRef idx="0">
-            <a:schemeClr val="accent1"/>
-          </a:effectRef>
-          <a:fontRef idx="minor">
-            <a:schemeClr val="tx1"/>
-          </a:fontRef>
-        </p:style>
-      </p:cxnSp>
     </p:spTree>
     <p:extLst>
       <p:ext uri="{BB962C8B-B14F-4D97-AF65-F5344CB8AC3E}">
@@ -6497,41 +5966,6 @@
           <a:chExt cx="0" cy="0"/>
         </a:xfrm>
       </p:grpSpPr>
-      <p:pic>
-        <p:nvPicPr>
-          <p:cNvPr id="14" name="Picture 13">
-            <a:extLst>
-              <a:ext uri="{FF2B5EF4-FFF2-40B4-BE49-F238E27FC236}">
-                <a16:creationId xmlns:a16="http://schemas.microsoft.com/office/drawing/2014/main" id="{E7A96C24-86CA-4BEF-B3D8-4C5D79D7D2DC}"/>
-              </a:ext>
-            </a:extLst>
-          </p:cNvPr>
-          <p:cNvPicPr>
-            <a:picLocks noChangeAspect="1"/>
-          </p:cNvPicPr>
-          <p:nvPr/>
-        </p:nvPicPr>
-        <p:blipFill>
-          <a:blip r:embed="rId2"/>
-          <a:stretch>
-            <a:fillRect/>
-          </a:stretch>
-        </p:blipFill>
-        <p:spPr>
-          <a:xfrm>
-            <a:off x="457200" y="2400461"/>
-            <a:ext cx="2924037" cy="1435803"/>
-          </a:xfrm>
-          <a:prstGeom prst="rect">
-            <a:avLst/>
-          </a:prstGeom>
-          <a:ln>
-            <a:solidFill>
-              <a:srgbClr val="C00000"/>
-            </a:solidFill>
-          </a:ln>
-        </p:spPr>
-      </p:pic>
       <p:sp>
         <p:nvSpPr>
           <p:cNvPr id="2" name="標題 1"/>
@@ -6609,8 +6043,8 @@
         </p:nvSpPr>
         <p:spPr>
           <a:xfrm>
-            <a:off x="467544" y="1268759"/>
-            <a:ext cx="8352928" cy="822219"/>
+            <a:off x="467544" y="1268760"/>
+            <a:ext cx="8352928" cy="648072"/>
           </a:xfrm>
           <a:ln>
             <a:solidFill>
@@ -6638,7 +6072,7 @@
                   <a:schemeClr val="tx1"/>
                 </a:solidFill>
               </a:rPr>
-              <a:t>Google “Collection API in Java”. The Collection Interface have Set, List, and Queue Interface.</a:t>
+              <a:t>In this example, we have Collection Interface and class ArrayList.</a:t>
             </a:r>
           </a:p>
           <a:p>
@@ -6656,7 +6090,7 @@
                   <a:schemeClr val="tx1"/>
                 </a:solidFill>
               </a:rPr>
-              <a:t>Inside the List interface, we have ArrayList, Vector, and LinkedList.</a:t>
+              <a:t>Once we got the object of ArrayList. </a:t>
             </a:r>
           </a:p>
         </p:txBody>
@@ -6788,2235 +6222,6 @@
           </a:p>
         </p:txBody>
       </p:sp>
-      <p:sp>
-        <p:nvSpPr>
-          <p:cNvPr id="7" name="Rectangle 6">
-            <a:extLst>
-              <a:ext uri="{FF2B5EF4-FFF2-40B4-BE49-F238E27FC236}">
-                <a16:creationId xmlns:a16="http://schemas.microsoft.com/office/drawing/2014/main" id="{F8961277-9E4D-4407-99EF-C4A7A1897ECA}"/>
-              </a:ext>
-            </a:extLst>
-          </p:cNvPr>
-          <p:cNvSpPr/>
-          <p:nvPr/>
-        </p:nvSpPr>
-        <p:spPr>
-          <a:xfrm>
-            <a:off x="5065712" y="2416122"/>
-            <a:ext cx="1224136" cy="360040"/>
-          </a:xfrm>
-          <a:prstGeom prst="rect">
-            <a:avLst/>
-          </a:prstGeom>
-          <a:solidFill>
-            <a:schemeClr val="bg1">
-              <a:lumMod val="85000"/>
-            </a:schemeClr>
-          </a:solidFill>
-          <a:ln>
-            <a:solidFill>
-              <a:srgbClr val="C00000"/>
-            </a:solidFill>
-          </a:ln>
-        </p:spPr>
-        <p:style>
-          <a:lnRef idx="2">
-            <a:schemeClr val="accent1">
-              <a:shade val="50000"/>
-            </a:schemeClr>
-          </a:lnRef>
-          <a:fillRef idx="1">
-            <a:schemeClr val="accent1"/>
-          </a:fillRef>
-          <a:effectRef idx="0">
-            <a:schemeClr val="accent1"/>
-          </a:effectRef>
-          <a:fontRef idx="minor">
-            <a:schemeClr val="lt1"/>
-          </a:fontRef>
-        </p:style>
-        <p:txBody>
-          <a:bodyPr rtlCol="0" anchor="ctr"/>
-          <a:lstStyle/>
-          <a:p>
-            <a:pPr algn="ctr"/>
-            <a:r>
-              <a:rPr lang="en-US" dirty="0">
-                <a:solidFill>
-                  <a:schemeClr val="tx1"/>
-                </a:solidFill>
-              </a:rPr>
-              <a:t>Collection</a:t>
-            </a:r>
-          </a:p>
-        </p:txBody>
-      </p:sp>
-      <p:sp>
-        <p:nvSpPr>
-          <p:cNvPr id="15" name="Rectangle 14">
-            <a:extLst>
-              <a:ext uri="{FF2B5EF4-FFF2-40B4-BE49-F238E27FC236}">
-                <a16:creationId xmlns:a16="http://schemas.microsoft.com/office/drawing/2014/main" id="{0F91B2E0-59EB-4B88-B26F-A4BC57F94C49}"/>
-              </a:ext>
-            </a:extLst>
-          </p:cNvPr>
-          <p:cNvSpPr/>
-          <p:nvPr/>
-        </p:nvSpPr>
-        <p:spPr>
-          <a:xfrm>
-            <a:off x="6450673" y="2416122"/>
-            <a:ext cx="395064" cy="360040"/>
-          </a:xfrm>
-          <a:prstGeom prst="rect">
-            <a:avLst/>
-          </a:prstGeom>
-          <a:solidFill>
-            <a:srgbClr val="FFFF00"/>
-          </a:solidFill>
-          <a:ln>
-            <a:solidFill>
-              <a:srgbClr val="C00000"/>
-            </a:solidFill>
-          </a:ln>
-        </p:spPr>
-        <p:style>
-          <a:lnRef idx="2">
-            <a:schemeClr val="accent1">
-              <a:shade val="50000"/>
-            </a:schemeClr>
-          </a:lnRef>
-          <a:fillRef idx="1">
-            <a:schemeClr val="accent1"/>
-          </a:fillRef>
-          <a:effectRef idx="0">
-            <a:schemeClr val="accent1"/>
-          </a:effectRef>
-          <a:fontRef idx="minor">
-            <a:schemeClr val="lt1"/>
-          </a:fontRef>
-        </p:style>
-        <p:txBody>
-          <a:bodyPr rtlCol="0" anchor="ctr"/>
-          <a:lstStyle/>
-          <a:p>
-            <a:pPr algn="ctr"/>
-            <a:r>
-              <a:rPr lang="en-US" dirty="0">
-                <a:solidFill>
-                  <a:schemeClr val="tx1"/>
-                </a:solidFill>
-              </a:rPr>
-              <a:t>I</a:t>
-            </a:r>
-          </a:p>
-        </p:txBody>
-      </p:sp>
-      <p:sp>
-        <p:nvSpPr>
-          <p:cNvPr id="17" name="Rectangle 16">
-            <a:extLst>
-              <a:ext uri="{FF2B5EF4-FFF2-40B4-BE49-F238E27FC236}">
-                <a16:creationId xmlns:a16="http://schemas.microsoft.com/office/drawing/2014/main" id="{609DEBB0-F3D9-46C3-967B-3F0A7A0B5802}"/>
-              </a:ext>
-            </a:extLst>
-          </p:cNvPr>
-          <p:cNvSpPr/>
-          <p:nvPr/>
-        </p:nvSpPr>
-        <p:spPr>
-          <a:xfrm>
-            <a:off x="349238" y="3946549"/>
-            <a:ext cx="1296144" cy="360040"/>
-          </a:xfrm>
-          <a:prstGeom prst="rect">
-            <a:avLst/>
-          </a:prstGeom>
-          <a:solidFill>
-            <a:srgbClr val="FFFF00"/>
-          </a:solidFill>
-          <a:ln>
-            <a:solidFill>
-              <a:srgbClr val="C00000"/>
-            </a:solidFill>
-          </a:ln>
-        </p:spPr>
-        <p:style>
-          <a:lnRef idx="2">
-            <a:schemeClr val="accent1">
-              <a:shade val="50000"/>
-            </a:schemeClr>
-          </a:lnRef>
-          <a:fillRef idx="1">
-            <a:schemeClr val="accent1"/>
-          </a:fillRef>
-          <a:effectRef idx="0">
-            <a:schemeClr val="accent1"/>
-          </a:effectRef>
-          <a:fontRef idx="minor">
-            <a:schemeClr val="lt1"/>
-          </a:fontRef>
-        </p:style>
-        <p:txBody>
-          <a:bodyPr rtlCol="0" anchor="ctr"/>
-          <a:lstStyle/>
-          <a:p>
-            <a:r>
-              <a:rPr lang="en-US" dirty="0">
-                <a:solidFill>
-                  <a:schemeClr val="tx1"/>
-                </a:solidFill>
-              </a:rPr>
-              <a:t>I: Interface</a:t>
-            </a:r>
-          </a:p>
-        </p:txBody>
-      </p:sp>
-      <p:sp>
-        <p:nvSpPr>
-          <p:cNvPr id="18" name="Rectangle 17">
-            <a:extLst>
-              <a:ext uri="{FF2B5EF4-FFF2-40B4-BE49-F238E27FC236}">
-                <a16:creationId xmlns:a16="http://schemas.microsoft.com/office/drawing/2014/main" id="{24617BF7-9ABA-4910-8EF0-A3F5E706AC18}"/>
-              </a:ext>
-            </a:extLst>
-          </p:cNvPr>
-          <p:cNvSpPr/>
-          <p:nvPr/>
-        </p:nvSpPr>
-        <p:spPr>
-          <a:xfrm>
-            <a:off x="3737910" y="3576105"/>
-            <a:ext cx="607722" cy="360040"/>
-          </a:xfrm>
-          <a:prstGeom prst="rect">
-            <a:avLst/>
-          </a:prstGeom>
-          <a:solidFill>
-            <a:schemeClr val="bg1">
-              <a:lumMod val="85000"/>
-            </a:schemeClr>
-          </a:solidFill>
-          <a:ln>
-            <a:solidFill>
-              <a:srgbClr val="C00000"/>
-            </a:solidFill>
-          </a:ln>
-        </p:spPr>
-        <p:style>
-          <a:lnRef idx="2">
-            <a:schemeClr val="accent1">
-              <a:shade val="50000"/>
-            </a:schemeClr>
-          </a:lnRef>
-          <a:fillRef idx="1">
-            <a:schemeClr val="accent1"/>
-          </a:fillRef>
-          <a:effectRef idx="0">
-            <a:schemeClr val="accent1"/>
-          </a:effectRef>
-          <a:fontRef idx="minor">
-            <a:schemeClr val="lt1"/>
-          </a:fontRef>
-        </p:style>
-        <p:txBody>
-          <a:bodyPr rtlCol="0" anchor="ctr"/>
-          <a:lstStyle/>
-          <a:p>
-            <a:pPr algn="ctr"/>
-            <a:r>
-              <a:rPr lang="en-US" dirty="0">
-                <a:solidFill>
-                  <a:schemeClr val="tx1"/>
-                </a:solidFill>
-              </a:rPr>
-              <a:t>Set</a:t>
-            </a:r>
-          </a:p>
-        </p:txBody>
-      </p:sp>
-      <p:sp>
-        <p:nvSpPr>
-          <p:cNvPr id="19" name="Rectangle 18">
-            <a:extLst>
-              <a:ext uri="{FF2B5EF4-FFF2-40B4-BE49-F238E27FC236}">
-                <a16:creationId xmlns:a16="http://schemas.microsoft.com/office/drawing/2014/main" id="{FF05E4AA-8CF1-47C5-ACE3-14D75BE2BED0}"/>
-              </a:ext>
-            </a:extLst>
-          </p:cNvPr>
-          <p:cNvSpPr/>
-          <p:nvPr/>
-        </p:nvSpPr>
-        <p:spPr>
-          <a:xfrm>
-            <a:off x="4436132" y="3579898"/>
-            <a:ext cx="395064" cy="360040"/>
-          </a:xfrm>
-          <a:prstGeom prst="rect">
-            <a:avLst/>
-          </a:prstGeom>
-          <a:solidFill>
-            <a:srgbClr val="FFFF00"/>
-          </a:solidFill>
-          <a:ln>
-            <a:solidFill>
-              <a:srgbClr val="C00000"/>
-            </a:solidFill>
-          </a:ln>
-        </p:spPr>
-        <p:style>
-          <a:lnRef idx="2">
-            <a:schemeClr val="accent1">
-              <a:shade val="50000"/>
-            </a:schemeClr>
-          </a:lnRef>
-          <a:fillRef idx="1">
-            <a:schemeClr val="accent1"/>
-          </a:fillRef>
-          <a:effectRef idx="0">
-            <a:schemeClr val="accent1"/>
-          </a:effectRef>
-          <a:fontRef idx="minor">
-            <a:schemeClr val="lt1"/>
-          </a:fontRef>
-        </p:style>
-        <p:txBody>
-          <a:bodyPr rtlCol="0" anchor="ctr"/>
-          <a:lstStyle/>
-          <a:p>
-            <a:pPr algn="ctr"/>
-            <a:r>
-              <a:rPr lang="en-US" dirty="0">
-                <a:solidFill>
-                  <a:schemeClr val="tx1"/>
-                </a:solidFill>
-              </a:rPr>
-              <a:t>I</a:t>
-            </a:r>
-          </a:p>
-        </p:txBody>
-      </p:sp>
-      <p:sp>
-        <p:nvSpPr>
-          <p:cNvPr id="20" name="Rectangle 19">
-            <a:extLst>
-              <a:ext uri="{FF2B5EF4-FFF2-40B4-BE49-F238E27FC236}">
-                <a16:creationId xmlns:a16="http://schemas.microsoft.com/office/drawing/2014/main" id="{9BAC5112-6C75-4A2A-A73E-15847975EF2C}"/>
-              </a:ext>
-            </a:extLst>
-          </p:cNvPr>
-          <p:cNvSpPr/>
-          <p:nvPr/>
-        </p:nvSpPr>
-        <p:spPr>
-          <a:xfrm>
-            <a:off x="5497760" y="3586509"/>
-            <a:ext cx="607722" cy="360040"/>
-          </a:xfrm>
-          <a:prstGeom prst="rect">
-            <a:avLst/>
-          </a:prstGeom>
-          <a:solidFill>
-            <a:schemeClr val="bg1">
-              <a:lumMod val="85000"/>
-            </a:schemeClr>
-          </a:solidFill>
-          <a:ln>
-            <a:solidFill>
-              <a:srgbClr val="C00000"/>
-            </a:solidFill>
-          </a:ln>
-        </p:spPr>
-        <p:style>
-          <a:lnRef idx="2">
-            <a:schemeClr val="accent1">
-              <a:shade val="50000"/>
-            </a:schemeClr>
-          </a:lnRef>
-          <a:fillRef idx="1">
-            <a:schemeClr val="accent1"/>
-          </a:fillRef>
-          <a:effectRef idx="0">
-            <a:schemeClr val="accent1"/>
-          </a:effectRef>
-          <a:fontRef idx="minor">
-            <a:schemeClr val="lt1"/>
-          </a:fontRef>
-        </p:style>
-        <p:txBody>
-          <a:bodyPr rtlCol="0" anchor="ctr"/>
-          <a:lstStyle/>
-          <a:p>
-            <a:pPr algn="ctr"/>
-            <a:r>
-              <a:rPr lang="en-US" dirty="0">
-                <a:solidFill>
-                  <a:schemeClr val="tx1"/>
-                </a:solidFill>
-              </a:rPr>
-              <a:t>List</a:t>
-            </a:r>
-          </a:p>
-        </p:txBody>
-      </p:sp>
-      <p:sp>
-        <p:nvSpPr>
-          <p:cNvPr id="21" name="Rectangle 20">
-            <a:extLst>
-              <a:ext uri="{FF2B5EF4-FFF2-40B4-BE49-F238E27FC236}">
-                <a16:creationId xmlns:a16="http://schemas.microsoft.com/office/drawing/2014/main" id="{C0D8BE60-B060-4570-A8F7-7314C6A66261}"/>
-              </a:ext>
-            </a:extLst>
-          </p:cNvPr>
-          <p:cNvSpPr/>
-          <p:nvPr/>
-        </p:nvSpPr>
-        <p:spPr>
-          <a:xfrm>
-            <a:off x="6195982" y="3590302"/>
-            <a:ext cx="395064" cy="360040"/>
-          </a:xfrm>
-          <a:prstGeom prst="rect">
-            <a:avLst/>
-          </a:prstGeom>
-          <a:solidFill>
-            <a:srgbClr val="FFFF00"/>
-          </a:solidFill>
-          <a:ln>
-            <a:solidFill>
-              <a:srgbClr val="C00000"/>
-            </a:solidFill>
-          </a:ln>
-        </p:spPr>
-        <p:style>
-          <a:lnRef idx="2">
-            <a:schemeClr val="accent1">
-              <a:shade val="50000"/>
-            </a:schemeClr>
-          </a:lnRef>
-          <a:fillRef idx="1">
-            <a:schemeClr val="accent1"/>
-          </a:fillRef>
-          <a:effectRef idx="0">
-            <a:schemeClr val="accent1"/>
-          </a:effectRef>
-          <a:fontRef idx="minor">
-            <a:schemeClr val="lt1"/>
-          </a:fontRef>
-        </p:style>
-        <p:txBody>
-          <a:bodyPr rtlCol="0" anchor="ctr"/>
-          <a:lstStyle/>
-          <a:p>
-            <a:pPr algn="ctr"/>
-            <a:r>
-              <a:rPr lang="en-US" dirty="0">
-                <a:solidFill>
-                  <a:schemeClr val="tx1"/>
-                </a:solidFill>
-              </a:rPr>
-              <a:t>I</a:t>
-            </a:r>
-          </a:p>
-        </p:txBody>
-      </p:sp>
-      <p:sp>
-        <p:nvSpPr>
-          <p:cNvPr id="22" name="Rectangle 21">
-            <a:extLst>
-              <a:ext uri="{FF2B5EF4-FFF2-40B4-BE49-F238E27FC236}">
-                <a16:creationId xmlns:a16="http://schemas.microsoft.com/office/drawing/2014/main" id="{9A2C9611-895C-404B-AEC0-A665E4295C86}"/>
-              </a:ext>
-            </a:extLst>
-          </p:cNvPr>
-          <p:cNvSpPr/>
-          <p:nvPr/>
-        </p:nvSpPr>
-        <p:spPr>
-          <a:xfrm>
-            <a:off x="7175803" y="3574207"/>
-            <a:ext cx="873895" cy="360040"/>
-          </a:xfrm>
-          <a:prstGeom prst="rect">
-            <a:avLst/>
-          </a:prstGeom>
-          <a:solidFill>
-            <a:schemeClr val="bg1">
-              <a:lumMod val="85000"/>
-            </a:schemeClr>
-          </a:solidFill>
-          <a:ln>
-            <a:solidFill>
-              <a:srgbClr val="C00000"/>
-            </a:solidFill>
-          </a:ln>
-        </p:spPr>
-        <p:style>
-          <a:lnRef idx="2">
-            <a:schemeClr val="accent1">
-              <a:shade val="50000"/>
-            </a:schemeClr>
-          </a:lnRef>
-          <a:fillRef idx="1">
-            <a:schemeClr val="accent1"/>
-          </a:fillRef>
-          <a:effectRef idx="0">
-            <a:schemeClr val="accent1"/>
-          </a:effectRef>
-          <a:fontRef idx="minor">
-            <a:schemeClr val="lt1"/>
-          </a:fontRef>
-        </p:style>
-        <p:txBody>
-          <a:bodyPr rtlCol="0" anchor="ctr"/>
-          <a:lstStyle/>
-          <a:p>
-            <a:pPr algn="ctr"/>
-            <a:r>
-              <a:rPr lang="en-US" dirty="0">
-                <a:solidFill>
-                  <a:schemeClr val="tx1"/>
-                </a:solidFill>
-              </a:rPr>
-              <a:t>Queue</a:t>
-            </a:r>
-          </a:p>
-        </p:txBody>
-      </p:sp>
-      <p:sp>
-        <p:nvSpPr>
-          <p:cNvPr id="23" name="Rectangle 22">
-            <a:extLst>
-              <a:ext uri="{FF2B5EF4-FFF2-40B4-BE49-F238E27FC236}">
-                <a16:creationId xmlns:a16="http://schemas.microsoft.com/office/drawing/2014/main" id="{57ABBF70-0FEF-44E2-B5D5-2018E187BCDC}"/>
-              </a:ext>
-            </a:extLst>
-          </p:cNvPr>
-          <p:cNvSpPr/>
-          <p:nvPr/>
-        </p:nvSpPr>
-        <p:spPr>
-          <a:xfrm>
-            <a:off x="8140198" y="3578000"/>
-            <a:ext cx="395064" cy="360040"/>
-          </a:xfrm>
-          <a:prstGeom prst="rect">
-            <a:avLst/>
-          </a:prstGeom>
-          <a:solidFill>
-            <a:srgbClr val="FFFF00"/>
-          </a:solidFill>
-          <a:ln>
-            <a:solidFill>
-              <a:srgbClr val="C00000"/>
-            </a:solidFill>
-          </a:ln>
-        </p:spPr>
-        <p:style>
-          <a:lnRef idx="2">
-            <a:schemeClr val="accent1">
-              <a:shade val="50000"/>
-            </a:schemeClr>
-          </a:lnRef>
-          <a:fillRef idx="1">
-            <a:schemeClr val="accent1"/>
-          </a:fillRef>
-          <a:effectRef idx="0">
-            <a:schemeClr val="accent1"/>
-          </a:effectRef>
-          <a:fontRef idx="minor">
-            <a:schemeClr val="lt1"/>
-          </a:fontRef>
-        </p:style>
-        <p:txBody>
-          <a:bodyPr rtlCol="0" anchor="ctr"/>
-          <a:lstStyle/>
-          <a:p>
-            <a:pPr algn="ctr"/>
-            <a:r>
-              <a:rPr lang="en-US" dirty="0">
-                <a:solidFill>
-                  <a:schemeClr val="tx1"/>
-                </a:solidFill>
-              </a:rPr>
-              <a:t>I</a:t>
-            </a:r>
-          </a:p>
-        </p:txBody>
-      </p:sp>
-      <p:cxnSp>
-        <p:nvCxnSpPr>
-          <p:cNvPr id="9" name="Straight Arrow Connector 8">
-            <a:extLst>
-              <a:ext uri="{FF2B5EF4-FFF2-40B4-BE49-F238E27FC236}">
-                <a16:creationId xmlns:a16="http://schemas.microsoft.com/office/drawing/2014/main" id="{26638DD6-F3D0-4760-9C16-4B5DCDD7590A}"/>
-              </a:ext>
-            </a:extLst>
-          </p:cNvPr>
-          <p:cNvCxnSpPr>
-            <a:cxnSpLocks/>
-            <a:stCxn id="18" idx="0"/>
-          </p:cNvCxnSpPr>
-          <p:nvPr/>
-        </p:nvCxnSpPr>
-        <p:spPr>
-          <a:xfrm flipV="1">
-            <a:off x="4041771" y="2765758"/>
-            <a:ext cx="1240945" cy="810347"/>
-          </a:xfrm>
-          <a:prstGeom prst="straightConnector1">
-            <a:avLst/>
-          </a:prstGeom>
-          <a:ln>
-            <a:solidFill>
-              <a:srgbClr val="C00000"/>
-            </a:solidFill>
-            <a:tailEnd type="triangle"/>
-          </a:ln>
-        </p:spPr>
-        <p:style>
-          <a:lnRef idx="1">
-            <a:schemeClr val="accent1"/>
-          </a:lnRef>
-          <a:fillRef idx="0">
-            <a:schemeClr val="accent1"/>
-          </a:fillRef>
-          <a:effectRef idx="0">
-            <a:schemeClr val="accent1"/>
-          </a:effectRef>
-          <a:fontRef idx="minor">
-            <a:schemeClr val="tx1"/>
-          </a:fontRef>
-        </p:style>
-      </p:cxnSp>
-      <p:cxnSp>
-        <p:nvCxnSpPr>
-          <p:cNvPr id="24" name="Straight Arrow Connector 23">
-            <a:extLst>
-              <a:ext uri="{FF2B5EF4-FFF2-40B4-BE49-F238E27FC236}">
-                <a16:creationId xmlns:a16="http://schemas.microsoft.com/office/drawing/2014/main" id="{0E11974D-CCBE-49C8-ABCE-C89C4BC58976}"/>
-              </a:ext>
-            </a:extLst>
-          </p:cNvPr>
-          <p:cNvCxnSpPr>
-            <a:cxnSpLocks/>
-            <a:stCxn id="20" idx="0"/>
-            <a:endCxn id="7" idx="2"/>
-          </p:cNvCxnSpPr>
-          <p:nvPr/>
-        </p:nvCxnSpPr>
-        <p:spPr>
-          <a:xfrm flipH="1" flipV="1">
-            <a:off x="5677780" y="2776162"/>
-            <a:ext cx="123841" cy="810347"/>
-          </a:xfrm>
-          <a:prstGeom prst="straightConnector1">
-            <a:avLst/>
-          </a:prstGeom>
-          <a:ln>
-            <a:solidFill>
-              <a:srgbClr val="C00000"/>
-            </a:solidFill>
-            <a:tailEnd type="triangle"/>
-          </a:ln>
-        </p:spPr>
-        <p:style>
-          <a:lnRef idx="1">
-            <a:schemeClr val="accent1"/>
-          </a:lnRef>
-          <a:fillRef idx="0">
-            <a:schemeClr val="accent1"/>
-          </a:fillRef>
-          <a:effectRef idx="0">
-            <a:schemeClr val="accent1"/>
-          </a:effectRef>
-          <a:fontRef idx="minor">
-            <a:schemeClr val="tx1"/>
-          </a:fontRef>
-        </p:style>
-      </p:cxnSp>
-      <p:cxnSp>
-        <p:nvCxnSpPr>
-          <p:cNvPr id="25" name="Straight Arrow Connector 24">
-            <a:extLst>
-              <a:ext uri="{FF2B5EF4-FFF2-40B4-BE49-F238E27FC236}">
-                <a16:creationId xmlns:a16="http://schemas.microsoft.com/office/drawing/2014/main" id="{C85BD751-5E36-4CCD-BBA0-E94E7DFE7503}"/>
-              </a:ext>
-            </a:extLst>
-          </p:cNvPr>
-          <p:cNvCxnSpPr>
-            <a:cxnSpLocks/>
-            <a:stCxn id="22" idx="0"/>
-          </p:cNvCxnSpPr>
-          <p:nvPr/>
-        </p:nvCxnSpPr>
-        <p:spPr>
-          <a:xfrm flipH="1" flipV="1">
-            <a:off x="6072844" y="2776162"/>
-            <a:ext cx="1539907" cy="798045"/>
-          </a:xfrm>
-          <a:prstGeom prst="straightConnector1">
-            <a:avLst/>
-          </a:prstGeom>
-          <a:ln>
-            <a:solidFill>
-              <a:srgbClr val="C00000"/>
-            </a:solidFill>
-            <a:tailEnd type="triangle"/>
-          </a:ln>
-        </p:spPr>
-        <p:style>
-          <a:lnRef idx="1">
-            <a:schemeClr val="accent1"/>
-          </a:lnRef>
-          <a:fillRef idx="0">
-            <a:schemeClr val="accent1"/>
-          </a:fillRef>
-          <a:effectRef idx="0">
-            <a:schemeClr val="accent1"/>
-          </a:effectRef>
-          <a:fontRef idx="minor">
-            <a:schemeClr val="tx1"/>
-          </a:fontRef>
-        </p:style>
-      </p:cxnSp>
-      <p:sp>
-        <p:nvSpPr>
-          <p:cNvPr id="30" name="Rectangle 29">
-            <a:extLst>
-              <a:ext uri="{FF2B5EF4-FFF2-40B4-BE49-F238E27FC236}">
-                <a16:creationId xmlns:a16="http://schemas.microsoft.com/office/drawing/2014/main" id="{F17DA1C0-D7E5-4C40-8995-F1B12CEF2C6D}"/>
-              </a:ext>
-            </a:extLst>
-          </p:cNvPr>
-          <p:cNvSpPr/>
-          <p:nvPr/>
-        </p:nvSpPr>
-        <p:spPr>
-          <a:xfrm>
-            <a:off x="910082" y="5710885"/>
-            <a:ext cx="1172013" cy="360040"/>
-          </a:xfrm>
-          <a:prstGeom prst="rect">
-            <a:avLst/>
-          </a:prstGeom>
-          <a:solidFill>
-            <a:schemeClr val="bg1">
-              <a:lumMod val="85000"/>
-            </a:schemeClr>
-          </a:solidFill>
-          <a:ln>
-            <a:solidFill>
-              <a:srgbClr val="C00000"/>
-            </a:solidFill>
-          </a:ln>
-        </p:spPr>
-        <p:style>
-          <a:lnRef idx="2">
-            <a:schemeClr val="accent1">
-              <a:shade val="50000"/>
-            </a:schemeClr>
-          </a:lnRef>
-          <a:fillRef idx="1">
-            <a:schemeClr val="accent1"/>
-          </a:fillRef>
-          <a:effectRef idx="0">
-            <a:schemeClr val="accent1"/>
-          </a:effectRef>
-          <a:fontRef idx="minor">
-            <a:schemeClr val="lt1"/>
-          </a:fontRef>
-        </p:style>
-        <p:txBody>
-          <a:bodyPr rtlCol="0" anchor="ctr"/>
-          <a:lstStyle/>
-          <a:p>
-            <a:pPr algn="ctr"/>
-            <a:r>
-              <a:rPr lang="en-US" dirty="0">
-                <a:solidFill>
-                  <a:schemeClr val="tx1"/>
-                </a:solidFill>
-              </a:rPr>
-              <a:t>HashSet</a:t>
-            </a:r>
-          </a:p>
-        </p:txBody>
-      </p:sp>
-      <p:cxnSp>
-        <p:nvCxnSpPr>
-          <p:cNvPr id="31" name="Straight Arrow Connector 30">
-            <a:extLst>
-              <a:ext uri="{FF2B5EF4-FFF2-40B4-BE49-F238E27FC236}">
-                <a16:creationId xmlns:a16="http://schemas.microsoft.com/office/drawing/2014/main" id="{C09F697E-4ECA-4447-90E8-B1B1EC7A4543}"/>
-              </a:ext>
-            </a:extLst>
-          </p:cNvPr>
-          <p:cNvCxnSpPr>
-            <a:cxnSpLocks/>
-            <a:stCxn id="30" idx="0"/>
-          </p:cNvCxnSpPr>
-          <p:nvPr/>
-        </p:nvCxnSpPr>
-        <p:spPr>
-          <a:xfrm flipV="1">
-            <a:off x="1496089" y="3946549"/>
-            <a:ext cx="2439891" cy="1764336"/>
-          </a:xfrm>
-          <a:prstGeom prst="straightConnector1">
-            <a:avLst/>
-          </a:prstGeom>
-          <a:ln>
-            <a:solidFill>
-              <a:srgbClr val="C00000"/>
-            </a:solidFill>
-            <a:prstDash val="lgDash"/>
-            <a:tailEnd type="triangle"/>
-          </a:ln>
-        </p:spPr>
-        <p:style>
-          <a:lnRef idx="1">
-            <a:schemeClr val="accent1"/>
-          </a:lnRef>
-          <a:fillRef idx="0">
-            <a:schemeClr val="accent1"/>
-          </a:fillRef>
-          <a:effectRef idx="0">
-            <a:schemeClr val="accent1"/>
-          </a:effectRef>
-          <a:fontRef idx="minor">
-            <a:schemeClr val="tx1"/>
-          </a:fontRef>
-        </p:style>
-      </p:cxnSp>
-      <p:sp>
-        <p:nvSpPr>
-          <p:cNvPr id="35" name="Rectangle 34">
-            <a:extLst>
-              <a:ext uri="{FF2B5EF4-FFF2-40B4-BE49-F238E27FC236}">
-                <a16:creationId xmlns:a16="http://schemas.microsoft.com/office/drawing/2014/main" id="{D1DD84A7-F15B-4064-A731-3DE5A4F7A67F}"/>
-              </a:ext>
-            </a:extLst>
-          </p:cNvPr>
-          <p:cNvSpPr/>
-          <p:nvPr/>
-        </p:nvSpPr>
-        <p:spPr>
-          <a:xfrm>
-            <a:off x="1666044" y="6389672"/>
-            <a:ext cx="1689499" cy="360040"/>
-          </a:xfrm>
-          <a:prstGeom prst="rect">
-            <a:avLst/>
-          </a:prstGeom>
-          <a:solidFill>
-            <a:schemeClr val="bg1">
-              <a:lumMod val="85000"/>
-            </a:schemeClr>
-          </a:solidFill>
-          <a:ln>
-            <a:solidFill>
-              <a:srgbClr val="C00000"/>
-            </a:solidFill>
-          </a:ln>
-        </p:spPr>
-        <p:style>
-          <a:lnRef idx="2">
-            <a:schemeClr val="accent1">
-              <a:shade val="50000"/>
-            </a:schemeClr>
-          </a:lnRef>
-          <a:fillRef idx="1">
-            <a:schemeClr val="accent1"/>
-          </a:fillRef>
-          <a:effectRef idx="0">
-            <a:schemeClr val="accent1"/>
-          </a:effectRef>
-          <a:fontRef idx="minor">
-            <a:schemeClr val="lt1"/>
-          </a:fontRef>
-        </p:style>
-        <p:txBody>
-          <a:bodyPr rtlCol="0" anchor="ctr"/>
-          <a:lstStyle/>
-          <a:p>
-            <a:pPr algn="ctr"/>
-            <a:r>
-              <a:rPr lang="en-US" dirty="0">
-                <a:solidFill>
-                  <a:schemeClr val="tx1"/>
-                </a:solidFill>
-              </a:rPr>
-              <a:t>LinkedHashSet</a:t>
-            </a:r>
-          </a:p>
-        </p:txBody>
-      </p:sp>
-      <p:cxnSp>
-        <p:nvCxnSpPr>
-          <p:cNvPr id="38" name="Straight Arrow Connector 37">
-            <a:extLst>
-              <a:ext uri="{FF2B5EF4-FFF2-40B4-BE49-F238E27FC236}">
-                <a16:creationId xmlns:a16="http://schemas.microsoft.com/office/drawing/2014/main" id="{1B32ADE6-7807-4870-9800-869A92C27C61}"/>
-              </a:ext>
-            </a:extLst>
-          </p:cNvPr>
-          <p:cNvCxnSpPr>
-            <a:cxnSpLocks/>
-            <a:stCxn id="35" idx="0"/>
-            <a:endCxn id="18" idx="2"/>
-          </p:cNvCxnSpPr>
-          <p:nvPr/>
-        </p:nvCxnSpPr>
-        <p:spPr>
-          <a:xfrm flipV="1">
-            <a:off x="2510794" y="3936145"/>
-            <a:ext cx="1530977" cy="2453527"/>
-          </a:xfrm>
-          <a:prstGeom prst="straightConnector1">
-            <a:avLst/>
-          </a:prstGeom>
-          <a:ln>
-            <a:solidFill>
-              <a:srgbClr val="C00000"/>
-            </a:solidFill>
-            <a:prstDash val="lgDash"/>
-            <a:tailEnd type="triangle"/>
-          </a:ln>
-        </p:spPr>
-        <p:style>
-          <a:lnRef idx="1">
-            <a:schemeClr val="accent1"/>
-          </a:lnRef>
-          <a:fillRef idx="0">
-            <a:schemeClr val="accent1"/>
-          </a:fillRef>
-          <a:effectRef idx="0">
-            <a:schemeClr val="accent1"/>
-          </a:effectRef>
-          <a:fontRef idx="minor">
-            <a:schemeClr val="tx1"/>
-          </a:fontRef>
-        </p:style>
-      </p:cxnSp>
-      <p:cxnSp>
-        <p:nvCxnSpPr>
-          <p:cNvPr id="42" name="Straight Arrow Connector 41">
-            <a:extLst>
-              <a:ext uri="{FF2B5EF4-FFF2-40B4-BE49-F238E27FC236}">
-                <a16:creationId xmlns:a16="http://schemas.microsoft.com/office/drawing/2014/main" id="{3D2C4126-056E-45BB-B2A9-9CAFA4AB1B24}"/>
-              </a:ext>
-            </a:extLst>
-          </p:cNvPr>
-          <p:cNvCxnSpPr>
-            <a:cxnSpLocks/>
-          </p:cNvCxnSpPr>
-          <p:nvPr/>
-        </p:nvCxnSpPr>
-        <p:spPr>
-          <a:xfrm flipV="1">
-            <a:off x="349238" y="4519895"/>
-            <a:ext cx="0" cy="332183"/>
-          </a:xfrm>
-          <a:prstGeom prst="straightConnector1">
-            <a:avLst/>
-          </a:prstGeom>
-          <a:ln>
-            <a:solidFill>
-              <a:srgbClr val="C00000"/>
-            </a:solidFill>
-            <a:prstDash val="lgDash"/>
-            <a:tailEnd type="triangle"/>
-          </a:ln>
-        </p:spPr>
-        <p:style>
-          <a:lnRef idx="1">
-            <a:schemeClr val="accent1"/>
-          </a:lnRef>
-          <a:fillRef idx="0">
-            <a:schemeClr val="accent1"/>
-          </a:fillRef>
-          <a:effectRef idx="0">
-            <a:schemeClr val="accent1"/>
-          </a:effectRef>
-          <a:fontRef idx="minor">
-            <a:schemeClr val="tx1"/>
-          </a:fontRef>
-        </p:style>
-      </p:cxnSp>
-      <p:sp>
-        <p:nvSpPr>
-          <p:cNvPr id="45" name="Rectangle 44">
-            <a:extLst>
-              <a:ext uri="{FF2B5EF4-FFF2-40B4-BE49-F238E27FC236}">
-                <a16:creationId xmlns:a16="http://schemas.microsoft.com/office/drawing/2014/main" id="{AC7AFF60-1DC2-4206-B664-684B51BB0B7E}"/>
-              </a:ext>
-            </a:extLst>
-          </p:cNvPr>
-          <p:cNvSpPr/>
-          <p:nvPr/>
-        </p:nvSpPr>
-        <p:spPr>
-          <a:xfrm>
-            <a:off x="453901" y="4492038"/>
-            <a:ext cx="1213339" cy="360040"/>
-          </a:xfrm>
-          <a:prstGeom prst="rect">
-            <a:avLst/>
-          </a:prstGeom>
-          <a:solidFill>
-            <a:srgbClr val="FFFF00"/>
-          </a:solidFill>
-          <a:ln>
-            <a:solidFill>
-              <a:srgbClr val="C00000"/>
-            </a:solidFill>
-          </a:ln>
-        </p:spPr>
-        <p:style>
-          <a:lnRef idx="2">
-            <a:schemeClr val="accent1">
-              <a:shade val="50000"/>
-            </a:schemeClr>
-          </a:lnRef>
-          <a:fillRef idx="1">
-            <a:schemeClr val="accent1"/>
-          </a:fillRef>
-          <a:effectRef idx="0">
-            <a:schemeClr val="accent1"/>
-          </a:effectRef>
-          <a:fontRef idx="minor">
-            <a:schemeClr val="lt1"/>
-          </a:fontRef>
-        </p:style>
-        <p:txBody>
-          <a:bodyPr rtlCol="0" anchor="ctr"/>
-          <a:lstStyle/>
-          <a:p>
-            <a:r>
-              <a:rPr lang="en-US" dirty="0">
-                <a:solidFill>
-                  <a:schemeClr val="tx1"/>
-                </a:solidFill>
-              </a:rPr>
-              <a:t>Implement</a:t>
-            </a:r>
-          </a:p>
-        </p:txBody>
-      </p:sp>
-      <p:cxnSp>
-        <p:nvCxnSpPr>
-          <p:cNvPr id="47" name="Straight Arrow Connector 46">
-            <a:extLst>
-              <a:ext uri="{FF2B5EF4-FFF2-40B4-BE49-F238E27FC236}">
-                <a16:creationId xmlns:a16="http://schemas.microsoft.com/office/drawing/2014/main" id="{D02CB1EB-41C9-4189-9665-B2BF2E1A199D}"/>
-              </a:ext>
-            </a:extLst>
-          </p:cNvPr>
-          <p:cNvCxnSpPr>
-            <a:cxnSpLocks/>
-          </p:cNvCxnSpPr>
-          <p:nvPr/>
-        </p:nvCxnSpPr>
-        <p:spPr>
-          <a:xfrm flipV="1">
-            <a:off x="348042" y="4990220"/>
-            <a:ext cx="0" cy="332183"/>
-          </a:xfrm>
-          <a:prstGeom prst="straightConnector1">
-            <a:avLst/>
-          </a:prstGeom>
-          <a:ln>
-            <a:solidFill>
-              <a:srgbClr val="C00000"/>
-            </a:solidFill>
-            <a:prstDash val="solid"/>
-            <a:tailEnd type="triangle"/>
-          </a:ln>
-        </p:spPr>
-        <p:style>
-          <a:lnRef idx="1">
-            <a:schemeClr val="accent1"/>
-          </a:lnRef>
-          <a:fillRef idx="0">
-            <a:schemeClr val="accent1"/>
-          </a:fillRef>
-          <a:effectRef idx="0">
-            <a:schemeClr val="accent1"/>
-          </a:effectRef>
-          <a:fontRef idx="minor">
-            <a:schemeClr val="tx1"/>
-          </a:fontRef>
-        </p:style>
-      </p:cxnSp>
-      <p:sp>
-        <p:nvSpPr>
-          <p:cNvPr id="48" name="Rectangle 47">
-            <a:extLst>
-              <a:ext uri="{FF2B5EF4-FFF2-40B4-BE49-F238E27FC236}">
-                <a16:creationId xmlns:a16="http://schemas.microsoft.com/office/drawing/2014/main" id="{90966164-9251-4C61-9133-732EF14D03FF}"/>
-              </a:ext>
-            </a:extLst>
-          </p:cNvPr>
-          <p:cNvSpPr/>
-          <p:nvPr/>
-        </p:nvSpPr>
-        <p:spPr>
-          <a:xfrm>
-            <a:off x="452705" y="4962363"/>
-            <a:ext cx="1213339" cy="360040"/>
-          </a:xfrm>
-          <a:prstGeom prst="rect">
-            <a:avLst/>
-          </a:prstGeom>
-          <a:solidFill>
-            <a:srgbClr val="FFFF00"/>
-          </a:solidFill>
-          <a:ln>
-            <a:solidFill>
-              <a:srgbClr val="C00000"/>
-            </a:solidFill>
-          </a:ln>
-        </p:spPr>
-        <p:style>
-          <a:lnRef idx="2">
-            <a:schemeClr val="accent1">
-              <a:shade val="50000"/>
-            </a:schemeClr>
-          </a:lnRef>
-          <a:fillRef idx="1">
-            <a:schemeClr val="accent1"/>
-          </a:fillRef>
-          <a:effectRef idx="0">
-            <a:schemeClr val="accent1"/>
-          </a:effectRef>
-          <a:fontRef idx="minor">
-            <a:schemeClr val="lt1"/>
-          </a:fontRef>
-        </p:style>
-        <p:txBody>
-          <a:bodyPr rtlCol="0" anchor="ctr"/>
-          <a:lstStyle/>
-          <a:p>
-            <a:r>
-              <a:rPr lang="en-US" dirty="0">
-                <a:solidFill>
-                  <a:schemeClr val="tx1"/>
-                </a:solidFill>
-              </a:rPr>
-              <a:t>extends</a:t>
-            </a:r>
-          </a:p>
-        </p:txBody>
-      </p:sp>
-      <p:sp>
-        <p:nvSpPr>
-          <p:cNvPr id="50" name="Rectangle 49">
-            <a:extLst>
-              <a:ext uri="{FF2B5EF4-FFF2-40B4-BE49-F238E27FC236}">
-                <a16:creationId xmlns:a16="http://schemas.microsoft.com/office/drawing/2014/main" id="{41529C5F-3E9D-4957-89E0-03A8494C1493}"/>
-              </a:ext>
-            </a:extLst>
-          </p:cNvPr>
-          <p:cNvSpPr/>
-          <p:nvPr/>
-        </p:nvSpPr>
-        <p:spPr>
-          <a:xfrm>
-            <a:off x="3730503" y="4606331"/>
-            <a:ext cx="1220182" cy="360040"/>
-          </a:xfrm>
-          <a:prstGeom prst="rect">
-            <a:avLst/>
-          </a:prstGeom>
-          <a:solidFill>
-            <a:schemeClr val="bg1">
-              <a:lumMod val="85000"/>
-            </a:schemeClr>
-          </a:solidFill>
-          <a:ln>
-            <a:solidFill>
-              <a:srgbClr val="C00000"/>
-            </a:solidFill>
-          </a:ln>
-        </p:spPr>
-        <p:style>
-          <a:lnRef idx="2">
-            <a:schemeClr val="accent1">
-              <a:shade val="50000"/>
-            </a:schemeClr>
-          </a:lnRef>
-          <a:fillRef idx="1">
-            <a:schemeClr val="accent1"/>
-          </a:fillRef>
-          <a:effectRef idx="0">
-            <a:schemeClr val="accent1"/>
-          </a:effectRef>
-          <a:fontRef idx="minor">
-            <a:schemeClr val="lt1"/>
-          </a:fontRef>
-        </p:style>
-        <p:txBody>
-          <a:bodyPr rtlCol="0" anchor="ctr"/>
-          <a:lstStyle/>
-          <a:p>
-            <a:pPr algn="ctr"/>
-            <a:r>
-              <a:rPr lang="en-US" dirty="0" err="1">
-                <a:solidFill>
-                  <a:schemeClr val="tx1"/>
-                </a:solidFill>
-              </a:rPr>
-              <a:t>SortedSet</a:t>
-            </a:r>
-            <a:endParaRPr lang="en-US" dirty="0">
-              <a:solidFill>
-                <a:schemeClr val="tx1"/>
-              </a:solidFill>
-            </a:endParaRPr>
-          </a:p>
-        </p:txBody>
-      </p:sp>
-      <p:cxnSp>
-        <p:nvCxnSpPr>
-          <p:cNvPr id="51" name="Straight Arrow Connector 50">
-            <a:extLst>
-              <a:ext uri="{FF2B5EF4-FFF2-40B4-BE49-F238E27FC236}">
-                <a16:creationId xmlns:a16="http://schemas.microsoft.com/office/drawing/2014/main" id="{A6DEE6D6-E57A-4C93-97A3-1B60972E0F32}"/>
-              </a:ext>
-            </a:extLst>
-          </p:cNvPr>
-          <p:cNvCxnSpPr>
-            <a:cxnSpLocks/>
-            <a:stCxn id="50" idx="0"/>
-          </p:cNvCxnSpPr>
-          <p:nvPr/>
-        </p:nvCxnSpPr>
-        <p:spPr>
-          <a:xfrm flipH="1" flipV="1">
-            <a:off x="4216568" y="3925741"/>
-            <a:ext cx="124026" cy="680590"/>
-          </a:xfrm>
-          <a:prstGeom prst="straightConnector1">
-            <a:avLst/>
-          </a:prstGeom>
-          <a:ln>
-            <a:solidFill>
-              <a:srgbClr val="C00000"/>
-            </a:solidFill>
-            <a:prstDash val="solid"/>
-            <a:tailEnd type="triangle"/>
-          </a:ln>
-        </p:spPr>
-        <p:style>
-          <a:lnRef idx="1">
-            <a:schemeClr val="accent1"/>
-          </a:lnRef>
-          <a:fillRef idx="0">
-            <a:schemeClr val="accent1"/>
-          </a:fillRef>
-          <a:effectRef idx="0">
-            <a:schemeClr val="accent1"/>
-          </a:effectRef>
-          <a:fontRef idx="minor">
-            <a:schemeClr val="tx1"/>
-          </a:fontRef>
-        </p:style>
-      </p:cxnSp>
-      <p:sp>
-        <p:nvSpPr>
-          <p:cNvPr id="54" name="Rectangle 53">
-            <a:extLst>
-              <a:ext uri="{FF2B5EF4-FFF2-40B4-BE49-F238E27FC236}">
-                <a16:creationId xmlns:a16="http://schemas.microsoft.com/office/drawing/2014/main" id="{2DA7C991-E339-4CD0-8EF5-BCD92B3AD246}"/>
-              </a:ext>
-            </a:extLst>
-          </p:cNvPr>
-          <p:cNvSpPr/>
-          <p:nvPr/>
-        </p:nvSpPr>
-        <p:spPr>
-          <a:xfrm>
-            <a:off x="3777492" y="5641150"/>
-            <a:ext cx="1173193" cy="360040"/>
-          </a:xfrm>
-          <a:prstGeom prst="rect">
-            <a:avLst/>
-          </a:prstGeom>
-          <a:solidFill>
-            <a:schemeClr val="bg1">
-              <a:lumMod val="85000"/>
-            </a:schemeClr>
-          </a:solidFill>
-          <a:ln>
-            <a:solidFill>
-              <a:srgbClr val="C00000"/>
-            </a:solidFill>
-          </a:ln>
-        </p:spPr>
-        <p:style>
-          <a:lnRef idx="2">
-            <a:schemeClr val="accent1">
-              <a:shade val="50000"/>
-            </a:schemeClr>
-          </a:lnRef>
-          <a:fillRef idx="1">
-            <a:schemeClr val="accent1"/>
-          </a:fillRef>
-          <a:effectRef idx="0">
-            <a:schemeClr val="accent1"/>
-          </a:effectRef>
-          <a:fontRef idx="minor">
-            <a:schemeClr val="lt1"/>
-          </a:fontRef>
-        </p:style>
-        <p:txBody>
-          <a:bodyPr rtlCol="0" anchor="ctr"/>
-          <a:lstStyle/>
-          <a:p>
-            <a:pPr algn="ctr"/>
-            <a:r>
-              <a:rPr lang="en-US" dirty="0" err="1">
-                <a:solidFill>
-                  <a:schemeClr val="tx1"/>
-                </a:solidFill>
-              </a:rPr>
-              <a:t>TreeSet</a:t>
-            </a:r>
-            <a:endParaRPr lang="en-US" dirty="0">
-              <a:solidFill>
-                <a:schemeClr val="tx1"/>
-              </a:solidFill>
-            </a:endParaRPr>
-          </a:p>
-        </p:txBody>
-      </p:sp>
-      <p:cxnSp>
-        <p:nvCxnSpPr>
-          <p:cNvPr id="55" name="Straight Arrow Connector 54">
-            <a:extLst>
-              <a:ext uri="{FF2B5EF4-FFF2-40B4-BE49-F238E27FC236}">
-                <a16:creationId xmlns:a16="http://schemas.microsoft.com/office/drawing/2014/main" id="{AD97B9AE-60A8-40D2-88CE-961D9CC94A38}"/>
-              </a:ext>
-            </a:extLst>
-          </p:cNvPr>
-          <p:cNvCxnSpPr>
-            <a:cxnSpLocks/>
-            <a:stCxn id="54" idx="0"/>
-            <a:endCxn id="50" idx="2"/>
-          </p:cNvCxnSpPr>
-          <p:nvPr/>
-        </p:nvCxnSpPr>
-        <p:spPr>
-          <a:xfrm flipH="1" flipV="1">
-            <a:off x="4340594" y="4966371"/>
-            <a:ext cx="23495" cy="674779"/>
-          </a:xfrm>
-          <a:prstGeom prst="straightConnector1">
-            <a:avLst/>
-          </a:prstGeom>
-          <a:ln>
-            <a:solidFill>
-              <a:srgbClr val="C00000"/>
-            </a:solidFill>
-            <a:prstDash val="lgDash"/>
-            <a:tailEnd type="triangle"/>
-          </a:ln>
-        </p:spPr>
-        <p:style>
-          <a:lnRef idx="1">
-            <a:schemeClr val="accent1"/>
-          </a:lnRef>
-          <a:fillRef idx="0">
-            <a:schemeClr val="accent1"/>
-          </a:fillRef>
-          <a:effectRef idx="0">
-            <a:schemeClr val="accent1"/>
-          </a:effectRef>
-          <a:fontRef idx="minor">
-            <a:schemeClr val="tx1"/>
-          </a:fontRef>
-        </p:style>
-      </p:cxnSp>
-      <p:sp>
-        <p:nvSpPr>
-          <p:cNvPr id="82" name="Rectangle 81">
-            <a:extLst>
-              <a:ext uri="{FF2B5EF4-FFF2-40B4-BE49-F238E27FC236}">
-                <a16:creationId xmlns:a16="http://schemas.microsoft.com/office/drawing/2014/main" id="{162245C0-F0A9-4B1E-86B7-84423EAA2322}"/>
-              </a:ext>
-            </a:extLst>
-          </p:cNvPr>
-          <p:cNvSpPr/>
-          <p:nvPr/>
-        </p:nvSpPr>
-        <p:spPr>
-          <a:xfrm>
-            <a:off x="4883369" y="5072648"/>
-            <a:ext cx="1172013" cy="360040"/>
-          </a:xfrm>
-          <a:prstGeom prst="rect">
-            <a:avLst/>
-          </a:prstGeom>
-          <a:solidFill>
-            <a:schemeClr val="bg1">
-              <a:lumMod val="85000"/>
-            </a:schemeClr>
-          </a:solidFill>
-          <a:ln>
-            <a:solidFill>
-              <a:srgbClr val="C00000"/>
-            </a:solidFill>
-          </a:ln>
-        </p:spPr>
-        <p:style>
-          <a:lnRef idx="2">
-            <a:schemeClr val="accent1">
-              <a:shade val="50000"/>
-            </a:schemeClr>
-          </a:lnRef>
-          <a:fillRef idx="1">
-            <a:schemeClr val="accent1"/>
-          </a:fillRef>
-          <a:effectRef idx="0">
-            <a:schemeClr val="accent1"/>
-          </a:effectRef>
-          <a:fontRef idx="minor">
-            <a:schemeClr val="lt1"/>
-          </a:fontRef>
-        </p:style>
-        <p:txBody>
-          <a:bodyPr rtlCol="0" anchor="ctr"/>
-          <a:lstStyle/>
-          <a:p>
-            <a:pPr algn="ctr"/>
-            <a:r>
-              <a:rPr lang="en-US" dirty="0">
-                <a:solidFill>
-                  <a:schemeClr val="tx1"/>
-                </a:solidFill>
-              </a:rPr>
-              <a:t>ArrayList</a:t>
-            </a:r>
-          </a:p>
-        </p:txBody>
-      </p:sp>
-      <p:sp>
-        <p:nvSpPr>
-          <p:cNvPr id="83" name="Rectangle 82">
-            <a:extLst>
-              <a:ext uri="{FF2B5EF4-FFF2-40B4-BE49-F238E27FC236}">
-                <a16:creationId xmlns:a16="http://schemas.microsoft.com/office/drawing/2014/main" id="{9B753F5F-B989-4069-B63E-4F1D654BB96F}"/>
-              </a:ext>
-            </a:extLst>
-          </p:cNvPr>
-          <p:cNvSpPr/>
-          <p:nvPr/>
-        </p:nvSpPr>
-        <p:spPr>
-          <a:xfrm>
-            <a:off x="5500134" y="5667830"/>
-            <a:ext cx="789714" cy="360040"/>
-          </a:xfrm>
-          <a:prstGeom prst="rect">
-            <a:avLst/>
-          </a:prstGeom>
-          <a:solidFill>
-            <a:schemeClr val="bg1">
-              <a:lumMod val="85000"/>
-            </a:schemeClr>
-          </a:solidFill>
-          <a:ln>
-            <a:solidFill>
-              <a:srgbClr val="C00000"/>
-            </a:solidFill>
-          </a:ln>
-        </p:spPr>
-        <p:style>
-          <a:lnRef idx="2">
-            <a:schemeClr val="accent1">
-              <a:shade val="50000"/>
-            </a:schemeClr>
-          </a:lnRef>
-          <a:fillRef idx="1">
-            <a:schemeClr val="accent1"/>
-          </a:fillRef>
-          <a:effectRef idx="0">
-            <a:schemeClr val="accent1"/>
-          </a:effectRef>
-          <a:fontRef idx="minor">
-            <a:schemeClr val="lt1"/>
-          </a:fontRef>
-        </p:style>
-        <p:txBody>
-          <a:bodyPr rtlCol="0" anchor="ctr"/>
-          <a:lstStyle/>
-          <a:p>
-            <a:pPr algn="ctr"/>
-            <a:r>
-              <a:rPr lang="en-US" dirty="0">
-                <a:solidFill>
-                  <a:schemeClr val="tx1"/>
-                </a:solidFill>
-              </a:rPr>
-              <a:t>Vector</a:t>
-            </a:r>
-          </a:p>
-        </p:txBody>
-      </p:sp>
-      <p:sp>
-        <p:nvSpPr>
-          <p:cNvPr id="84" name="Rectangle 83">
-            <a:extLst>
-              <a:ext uri="{FF2B5EF4-FFF2-40B4-BE49-F238E27FC236}">
-                <a16:creationId xmlns:a16="http://schemas.microsoft.com/office/drawing/2014/main" id="{97617A6F-C059-4CC4-914F-8D980B7611F6}"/>
-              </a:ext>
-            </a:extLst>
-          </p:cNvPr>
-          <p:cNvSpPr/>
-          <p:nvPr/>
-        </p:nvSpPr>
-        <p:spPr>
-          <a:xfrm>
-            <a:off x="5899860" y="6260122"/>
-            <a:ext cx="1359252" cy="360040"/>
-          </a:xfrm>
-          <a:prstGeom prst="rect">
-            <a:avLst/>
-          </a:prstGeom>
-          <a:solidFill>
-            <a:schemeClr val="bg1">
-              <a:lumMod val="85000"/>
-            </a:schemeClr>
-          </a:solidFill>
-          <a:ln>
-            <a:solidFill>
-              <a:srgbClr val="C00000"/>
-            </a:solidFill>
-          </a:ln>
-        </p:spPr>
-        <p:style>
-          <a:lnRef idx="2">
-            <a:schemeClr val="accent1">
-              <a:shade val="50000"/>
-            </a:schemeClr>
-          </a:lnRef>
-          <a:fillRef idx="1">
-            <a:schemeClr val="accent1"/>
-          </a:fillRef>
-          <a:effectRef idx="0">
-            <a:schemeClr val="accent1"/>
-          </a:effectRef>
-          <a:fontRef idx="minor">
-            <a:schemeClr val="lt1"/>
-          </a:fontRef>
-        </p:style>
-        <p:txBody>
-          <a:bodyPr rtlCol="0" anchor="ctr"/>
-          <a:lstStyle/>
-          <a:p>
-            <a:pPr algn="ctr"/>
-            <a:r>
-              <a:rPr lang="en-US" dirty="0">
-                <a:solidFill>
-                  <a:schemeClr val="tx1"/>
-                </a:solidFill>
-              </a:rPr>
-              <a:t>LinkedList</a:t>
-            </a:r>
-          </a:p>
-        </p:txBody>
-      </p:sp>
-      <p:cxnSp>
-        <p:nvCxnSpPr>
-          <p:cNvPr id="85" name="Straight Arrow Connector 84">
-            <a:extLst>
-              <a:ext uri="{FF2B5EF4-FFF2-40B4-BE49-F238E27FC236}">
-                <a16:creationId xmlns:a16="http://schemas.microsoft.com/office/drawing/2014/main" id="{53D2C6E5-26AB-4BCD-8B85-410ACB21CD0B}"/>
-              </a:ext>
-            </a:extLst>
-          </p:cNvPr>
-          <p:cNvCxnSpPr>
-            <a:cxnSpLocks/>
-            <a:stCxn id="82" idx="0"/>
-          </p:cNvCxnSpPr>
-          <p:nvPr/>
-        </p:nvCxnSpPr>
-        <p:spPr>
-          <a:xfrm flipV="1">
-            <a:off x="5469376" y="3946549"/>
-            <a:ext cx="189855" cy="1126099"/>
-          </a:xfrm>
-          <a:prstGeom prst="straightConnector1">
-            <a:avLst/>
-          </a:prstGeom>
-          <a:ln>
-            <a:solidFill>
-              <a:srgbClr val="C00000"/>
-            </a:solidFill>
-            <a:prstDash val="lgDash"/>
-            <a:tailEnd type="triangle"/>
-          </a:ln>
-        </p:spPr>
-        <p:style>
-          <a:lnRef idx="1">
-            <a:schemeClr val="accent1"/>
-          </a:lnRef>
-          <a:fillRef idx="0">
-            <a:schemeClr val="accent1"/>
-          </a:fillRef>
-          <a:effectRef idx="0">
-            <a:schemeClr val="accent1"/>
-          </a:effectRef>
-          <a:fontRef idx="minor">
-            <a:schemeClr val="tx1"/>
-          </a:fontRef>
-        </p:style>
-      </p:cxnSp>
-      <p:cxnSp>
-        <p:nvCxnSpPr>
-          <p:cNvPr id="90" name="Straight Arrow Connector 89">
-            <a:extLst>
-              <a:ext uri="{FF2B5EF4-FFF2-40B4-BE49-F238E27FC236}">
-                <a16:creationId xmlns:a16="http://schemas.microsoft.com/office/drawing/2014/main" id="{DE61A61D-7B5C-4925-AFCA-04E29B56A714}"/>
-              </a:ext>
-            </a:extLst>
-          </p:cNvPr>
-          <p:cNvCxnSpPr>
-            <a:cxnSpLocks/>
-            <a:stCxn id="83" idx="0"/>
-            <a:endCxn id="20" idx="2"/>
-          </p:cNvCxnSpPr>
-          <p:nvPr/>
-        </p:nvCxnSpPr>
-        <p:spPr>
-          <a:xfrm flipH="1" flipV="1">
-            <a:off x="5801621" y="3946549"/>
-            <a:ext cx="93370" cy="1721281"/>
-          </a:xfrm>
-          <a:prstGeom prst="straightConnector1">
-            <a:avLst/>
-          </a:prstGeom>
-          <a:ln>
-            <a:solidFill>
-              <a:srgbClr val="C00000"/>
-            </a:solidFill>
-            <a:prstDash val="lgDash"/>
-            <a:tailEnd type="triangle"/>
-          </a:ln>
-        </p:spPr>
-        <p:style>
-          <a:lnRef idx="1">
-            <a:schemeClr val="accent1"/>
-          </a:lnRef>
-          <a:fillRef idx="0">
-            <a:schemeClr val="accent1"/>
-          </a:fillRef>
-          <a:effectRef idx="0">
-            <a:schemeClr val="accent1"/>
-          </a:effectRef>
-          <a:fontRef idx="minor">
-            <a:schemeClr val="tx1"/>
-          </a:fontRef>
-        </p:style>
-      </p:cxnSp>
-      <p:cxnSp>
-        <p:nvCxnSpPr>
-          <p:cNvPr id="94" name="Straight Arrow Connector 93">
-            <a:extLst>
-              <a:ext uri="{FF2B5EF4-FFF2-40B4-BE49-F238E27FC236}">
-                <a16:creationId xmlns:a16="http://schemas.microsoft.com/office/drawing/2014/main" id="{5B3E06C2-88FA-4AC6-A231-6B2913F9A856}"/>
-              </a:ext>
-            </a:extLst>
-          </p:cNvPr>
-          <p:cNvCxnSpPr>
-            <a:cxnSpLocks/>
-            <a:stCxn id="84" idx="0"/>
-          </p:cNvCxnSpPr>
-          <p:nvPr/>
-        </p:nvCxnSpPr>
-        <p:spPr>
-          <a:xfrm flipH="1" flipV="1">
-            <a:off x="5925357" y="3934247"/>
-            <a:ext cx="654129" cy="2325875"/>
-          </a:xfrm>
-          <a:prstGeom prst="straightConnector1">
-            <a:avLst/>
-          </a:prstGeom>
-          <a:ln>
-            <a:solidFill>
-              <a:srgbClr val="C00000"/>
-            </a:solidFill>
-            <a:prstDash val="lgDash"/>
-            <a:tailEnd type="triangle"/>
-          </a:ln>
-        </p:spPr>
-        <p:style>
-          <a:lnRef idx="1">
-            <a:schemeClr val="accent1"/>
-          </a:lnRef>
-          <a:fillRef idx="0">
-            <a:schemeClr val="accent1"/>
-          </a:fillRef>
-          <a:effectRef idx="0">
-            <a:schemeClr val="accent1"/>
-          </a:effectRef>
-          <a:fontRef idx="minor">
-            <a:schemeClr val="tx1"/>
-          </a:fontRef>
-        </p:style>
-      </p:cxnSp>
-      <p:cxnSp>
-        <p:nvCxnSpPr>
-          <p:cNvPr id="99" name="Straight Arrow Connector 98">
-            <a:extLst>
-              <a:ext uri="{FF2B5EF4-FFF2-40B4-BE49-F238E27FC236}">
-                <a16:creationId xmlns:a16="http://schemas.microsoft.com/office/drawing/2014/main" id="{C85D836C-17CA-41D8-BED8-4E54555965F7}"/>
-              </a:ext>
-            </a:extLst>
-          </p:cNvPr>
-          <p:cNvCxnSpPr>
-            <a:cxnSpLocks/>
-            <a:stCxn id="84" idx="0"/>
-            <a:endCxn id="103" idx="2"/>
-          </p:cNvCxnSpPr>
-          <p:nvPr/>
-        </p:nvCxnSpPr>
-        <p:spPr>
-          <a:xfrm flipV="1">
-            <a:off x="6579486" y="4987209"/>
-            <a:ext cx="753037" cy="1272913"/>
-          </a:xfrm>
-          <a:prstGeom prst="straightConnector1">
-            <a:avLst/>
-          </a:prstGeom>
-          <a:ln>
-            <a:solidFill>
-              <a:srgbClr val="C00000"/>
-            </a:solidFill>
-            <a:prstDash val="lgDash"/>
-            <a:tailEnd type="triangle"/>
-          </a:ln>
-        </p:spPr>
-        <p:style>
-          <a:lnRef idx="1">
-            <a:schemeClr val="accent1"/>
-          </a:lnRef>
-          <a:fillRef idx="0">
-            <a:schemeClr val="accent1"/>
-          </a:fillRef>
-          <a:effectRef idx="0">
-            <a:schemeClr val="accent1"/>
-          </a:effectRef>
-          <a:fontRef idx="minor">
-            <a:schemeClr val="tx1"/>
-          </a:fontRef>
-        </p:style>
-      </p:cxnSp>
-      <p:sp>
-        <p:nvSpPr>
-          <p:cNvPr id="103" name="Rectangle 102">
-            <a:extLst>
-              <a:ext uri="{FF2B5EF4-FFF2-40B4-BE49-F238E27FC236}">
-                <a16:creationId xmlns:a16="http://schemas.microsoft.com/office/drawing/2014/main" id="{02830D17-07B2-40CA-9C66-015171866D1F}"/>
-              </a:ext>
-            </a:extLst>
-          </p:cNvPr>
-          <p:cNvSpPr/>
-          <p:nvPr/>
-        </p:nvSpPr>
-        <p:spPr>
-          <a:xfrm>
-            <a:off x="6810805" y="4627169"/>
-            <a:ext cx="1043435" cy="360040"/>
-          </a:xfrm>
-          <a:prstGeom prst="rect">
-            <a:avLst/>
-          </a:prstGeom>
-          <a:solidFill>
-            <a:schemeClr val="bg1">
-              <a:lumMod val="85000"/>
-            </a:schemeClr>
-          </a:solidFill>
-          <a:ln>
-            <a:solidFill>
-              <a:srgbClr val="C00000"/>
-            </a:solidFill>
-          </a:ln>
-        </p:spPr>
-        <p:style>
-          <a:lnRef idx="2">
-            <a:schemeClr val="accent1">
-              <a:shade val="50000"/>
-            </a:schemeClr>
-          </a:lnRef>
-          <a:fillRef idx="1">
-            <a:schemeClr val="accent1"/>
-          </a:fillRef>
-          <a:effectRef idx="0">
-            <a:schemeClr val="accent1"/>
-          </a:effectRef>
-          <a:fontRef idx="minor">
-            <a:schemeClr val="lt1"/>
-          </a:fontRef>
-        </p:style>
-        <p:txBody>
-          <a:bodyPr rtlCol="0" anchor="ctr"/>
-          <a:lstStyle/>
-          <a:p>
-            <a:pPr algn="ctr"/>
-            <a:r>
-              <a:rPr lang="en-US" dirty="0">
-                <a:solidFill>
-                  <a:schemeClr val="tx1"/>
-                </a:solidFill>
-              </a:rPr>
-              <a:t>Dequeue</a:t>
-            </a:r>
-          </a:p>
-        </p:txBody>
-      </p:sp>
-      <p:cxnSp>
-        <p:nvCxnSpPr>
-          <p:cNvPr id="107" name="Straight Arrow Connector 106">
-            <a:extLst>
-              <a:ext uri="{FF2B5EF4-FFF2-40B4-BE49-F238E27FC236}">
-                <a16:creationId xmlns:a16="http://schemas.microsoft.com/office/drawing/2014/main" id="{7F029B86-6ABB-43A8-A943-F87E457D990C}"/>
-              </a:ext>
-            </a:extLst>
-          </p:cNvPr>
-          <p:cNvCxnSpPr>
-            <a:cxnSpLocks/>
-            <a:stCxn id="103" idx="0"/>
-          </p:cNvCxnSpPr>
-          <p:nvPr/>
-        </p:nvCxnSpPr>
-        <p:spPr>
-          <a:xfrm flipV="1">
-            <a:off x="7332523" y="3934247"/>
-            <a:ext cx="101266" cy="692922"/>
-          </a:xfrm>
-          <a:prstGeom prst="straightConnector1">
-            <a:avLst/>
-          </a:prstGeom>
-          <a:ln>
-            <a:solidFill>
-              <a:srgbClr val="C00000"/>
-            </a:solidFill>
-            <a:prstDash val="solid"/>
-            <a:tailEnd type="triangle"/>
-          </a:ln>
-        </p:spPr>
-        <p:style>
-          <a:lnRef idx="1">
-            <a:schemeClr val="accent1"/>
-          </a:lnRef>
-          <a:fillRef idx="0">
-            <a:schemeClr val="accent1"/>
-          </a:fillRef>
-          <a:effectRef idx="0">
-            <a:schemeClr val="accent1"/>
-          </a:effectRef>
-          <a:fontRef idx="minor">
-            <a:schemeClr val="tx1"/>
-          </a:fontRef>
-        </p:style>
-      </p:cxnSp>
-      <p:sp>
-        <p:nvSpPr>
-          <p:cNvPr id="114" name="Rectangle 113">
-            <a:extLst>
-              <a:ext uri="{FF2B5EF4-FFF2-40B4-BE49-F238E27FC236}">
-                <a16:creationId xmlns:a16="http://schemas.microsoft.com/office/drawing/2014/main" id="{28A2BBE6-2994-4A78-B71D-3C31DF3B88DC}"/>
-              </a:ext>
-            </a:extLst>
-          </p:cNvPr>
-          <p:cNvSpPr/>
-          <p:nvPr/>
-        </p:nvSpPr>
-        <p:spPr>
-          <a:xfrm>
-            <a:off x="7304456" y="5385578"/>
-            <a:ext cx="1575492" cy="360040"/>
-          </a:xfrm>
-          <a:prstGeom prst="rect">
-            <a:avLst/>
-          </a:prstGeom>
-          <a:solidFill>
-            <a:schemeClr val="bg1">
-              <a:lumMod val="85000"/>
-            </a:schemeClr>
-          </a:solidFill>
-          <a:ln>
-            <a:solidFill>
-              <a:srgbClr val="C00000"/>
-            </a:solidFill>
-          </a:ln>
-        </p:spPr>
-        <p:style>
-          <a:lnRef idx="2">
-            <a:schemeClr val="accent1">
-              <a:shade val="50000"/>
-            </a:schemeClr>
-          </a:lnRef>
-          <a:fillRef idx="1">
-            <a:schemeClr val="accent1"/>
-          </a:fillRef>
-          <a:effectRef idx="0">
-            <a:schemeClr val="accent1"/>
-          </a:effectRef>
-          <a:fontRef idx="minor">
-            <a:schemeClr val="lt1"/>
-          </a:fontRef>
-        </p:style>
-        <p:txBody>
-          <a:bodyPr rtlCol="0" anchor="ctr"/>
-          <a:lstStyle/>
-          <a:p>
-            <a:pPr algn="ctr"/>
-            <a:r>
-              <a:rPr lang="en-US" dirty="0">
-                <a:solidFill>
-                  <a:schemeClr val="tx1"/>
-                </a:solidFill>
-              </a:rPr>
-              <a:t>PriorityQueue</a:t>
-            </a:r>
-          </a:p>
-        </p:txBody>
-      </p:sp>
-      <p:cxnSp>
-        <p:nvCxnSpPr>
-          <p:cNvPr id="115" name="Straight Arrow Connector 114">
-            <a:extLst>
-              <a:ext uri="{FF2B5EF4-FFF2-40B4-BE49-F238E27FC236}">
-                <a16:creationId xmlns:a16="http://schemas.microsoft.com/office/drawing/2014/main" id="{A866FE75-D3A8-4C28-AAAE-CEFA2A9D423D}"/>
-              </a:ext>
-            </a:extLst>
-          </p:cNvPr>
-          <p:cNvCxnSpPr>
-            <a:cxnSpLocks/>
-            <a:stCxn id="114" idx="0"/>
-          </p:cNvCxnSpPr>
-          <p:nvPr/>
-        </p:nvCxnSpPr>
-        <p:spPr>
-          <a:xfrm flipH="1" flipV="1">
-            <a:off x="7778577" y="3925741"/>
-            <a:ext cx="313625" cy="1459837"/>
-          </a:xfrm>
-          <a:prstGeom prst="straightConnector1">
-            <a:avLst/>
-          </a:prstGeom>
-          <a:ln>
-            <a:solidFill>
-              <a:srgbClr val="C00000"/>
-            </a:solidFill>
-            <a:prstDash val="solid"/>
-            <a:tailEnd type="triangle"/>
-          </a:ln>
-        </p:spPr>
-        <p:style>
-          <a:lnRef idx="1">
-            <a:schemeClr val="accent1"/>
-          </a:lnRef>
-          <a:fillRef idx="0">
-            <a:schemeClr val="accent1"/>
-          </a:fillRef>
-          <a:effectRef idx="0">
-            <a:schemeClr val="accent1"/>
-          </a:effectRef>
-          <a:fontRef idx="minor">
-            <a:schemeClr val="tx1"/>
-          </a:fontRef>
-        </p:style>
-      </p:cxnSp>
-    </p:spTree>
-    <p:extLst>
-      <p:ext uri="{BB962C8B-B14F-4D97-AF65-F5344CB8AC3E}">
-        <p14:creationId xmlns:p14="http://schemas.microsoft.com/office/powerpoint/2010/main" val="391557491"/>
-      </p:ext>
-    </p:extLst>
-  </p:cSld>
-  <p:clrMapOvr>
-    <a:masterClrMapping/>
-  </p:clrMapOvr>
-</p:sld>
-</file>
-
-<file path=ppt/slides/slide6.xml><?xml version="1.0" encoding="utf-8"?>
-<p:sld xmlns:a="http://schemas.openxmlformats.org/drawingml/2006/main" xmlns:r="http://schemas.openxmlformats.org/officeDocument/2006/relationships" xmlns:p="http://schemas.openxmlformats.org/presentationml/2006/main">
-  <p:cSld>
-    <p:spTree>
-      <p:nvGrpSpPr>
-        <p:cNvPr id="1" name=""/>
-        <p:cNvGrpSpPr/>
-        <p:nvPr/>
-      </p:nvGrpSpPr>
-      <p:grpSpPr>
-        <a:xfrm>
-          <a:off x="0" y="0"/>
-          <a:ext cx="0" cy="0"/>
-          <a:chOff x="0" y="0"/>
-          <a:chExt cx="0" cy="0"/>
-        </a:xfrm>
-      </p:grpSpPr>
-      <p:sp>
-        <p:nvSpPr>
-          <p:cNvPr id="2" name="標題 1"/>
-          <p:cNvSpPr>
-            <a:spLocks noGrp="1"/>
-          </p:cNvSpPr>
-          <p:nvPr>
-            <p:ph type="ctrTitle"/>
-          </p:nvPr>
-        </p:nvSpPr>
-        <p:spPr>
-          <a:xfrm>
-            <a:off x="0" y="1"/>
-            <a:ext cx="9144000" cy="764704"/>
-          </a:xfrm>
-          <a:gradFill flip="none" rotWithShape="1">
-            <a:gsLst>
-              <a:gs pos="0">
-                <a:srgbClr val="C00000">
-                  <a:shade val="30000"/>
-                  <a:satMod val="115000"/>
-                </a:srgbClr>
-              </a:gs>
-              <a:gs pos="50000">
-                <a:srgbClr val="C00000">
-                  <a:shade val="67500"/>
-                  <a:satMod val="115000"/>
-                </a:srgbClr>
-              </a:gs>
-              <a:gs pos="100000">
-                <a:srgbClr val="C00000">
-                  <a:shade val="100000"/>
-                  <a:satMod val="115000"/>
-                </a:srgbClr>
-              </a:gs>
-            </a:gsLst>
-            <a:path path="circle">
-              <a:fillToRect t="100000" r="100000"/>
-            </a:path>
-            <a:tileRect l="-100000" b="-100000"/>
-          </a:gradFill>
-        </p:spPr>
-        <p:txBody>
-          <a:bodyPr>
-            <a:normAutofit/>
-          </a:bodyPr>
-          <a:lstStyle/>
-          <a:p>
-            <a:pPr algn="l"/>
-            <a:r>
-              <a:rPr lang="en-US" altLang="zh-TW" b="1" dirty="0">
-                <a:solidFill>
-                  <a:srgbClr val="FFFF00"/>
-                </a:solidFill>
-              </a:rPr>
-              <a:t>14.02 Collection and Generic Practical</a:t>
-            </a:r>
-            <a:endParaRPr lang="zh-TW" altLang="en-US" b="1" dirty="0">
-              <a:solidFill>
-                <a:srgbClr val="FFFF00"/>
-              </a:solidFill>
-            </a:endParaRPr>
-          </a:p>
-        </p:txBody>
-      </p:sp>
-      <p:sp>
-        <p:nvSpPr>
-          <p:cNvPr id="3" name="副標題 2"/>
-          <p:cNvSpPr>
-            <a:spLocks noGrp="1"/>
-          </p:cNvSpPr>
-          <p:nvPr>
-            <p:ph type="subTitle" idx="1"/>
-          </p:nvPr>
-        </p:nvSpPr>
-        <p:spPr>
-          <a:xfrm>
-            <a:off x="467544" y="1268760"/>
-            <a:ext cx="8352928" cy="648072"/>
-          </a:xfrm>
-          <a:ln>
-            <a:solidFill>
-              <a:srgbClr val="C00000"/>
-            </a:solidFill>
-          </a:ln>
-        </p:spPr>
-        <p:txBody>
-          <a:bodyPr>
-            <a:noAutofit/>
-          </a:bodyPr>
-          <a:lstStyle/>
-          <a:p>
-            <a:pPr marL="342900" indent="-342900" algn="l">
-              <a:buClr>
-                <a:srgbClr val="0070C0"/>
-              </a:buClr>
-              <a:buSzPct val="80000"/>
-              <a:buFont typeface="Wingdings" pitchFamily="2" charset="2"/>
-              <a:buChar char="u"/>
-            </a:pPr>
-            <a:r>
-              <a:rPr lang="en-US" altLang="zh-TW" sz="1600" dirty="0">
-                <a:solidFill>
-                  <a:schemeClr val="tx1"/>
-                </a:solidFill>
-              </a:rPr>
-              <a:t>In this example, we have Collection Interface and class ArrayList.</a:t>
-            </a:r>
-          </a:p>
-          <a:p>
-            <a:pPr marL="342900" indent="-342900" algn="l">
-              <a:buClr>
-                <a:srgbClr val="0070C0"/>
-              </a:buClr>
-              <a:buSzPct val="80000"/>
-              <a:buFont typeface="Wingdings" pitchFamily="2" charset="2"/>
-              <a:buChar char="u"/>
-            </a:pPr>
-            <a:r>
-              <a:rPr lang="en-US" altLang="zh-TW" sz="1600" dirty="0">
-                <a:solidFill>
-                  <a:schemeClr val="tx1"/>
-                </a:solidFill>
-              </a:rPr>
-              <a:t>Once we got the object of ArrayList. </a:t>
-            </a:r>
-          </a:p>
-        </p:txBody>
-      </p:sp>
-      <p:sp>
-        <p:nvSpPr>
-          <p:cNvPr id="4" name="標題 1"/>
-          <p:cNvSpPr txBox="1">
-            <a:spLocks/>
-          </p:cNvSpPr>
-          <p:nvPr/>
-        </p:nvSpPr>
-        <p:spPr>
-          <a:xfrm>
-            <a:off x="0" y="764704"/>
-            <a:ext cx="9144000" cy="360040"/>
-          </a:xfrm>
-          <a:prstGeom prst="rect">
-            <a:avLst/>
-          </a:prstGeom>
-          <a:gradFill flip="none" rotWithShape="1">
-            <a:gsLst>
-              <a:gs pos="0">
-                <a:srgbClr val="00B0F0">
-                  <a:shade val="30000"/>
-                  <a:satMod val="115000"/>
-                </a:srgbClr>
-              </a:gs>
-              <a:gs pos="50000">
-                <a:srgbClr val="00B0F0">
-                  <a:shade val="67500"/>
-                  <a:satMod val="115000"/>
-                </a:srgbClr>
-              </a:gs>
-              <a:gs pos="100000">
-                <a:srgbClr val="00B0F0">
-                  <a:shade val="100000"/>
-                  <a:satMod val="115000"/>
-                </a:srgbClr>
-              </a:gs>
-            </a:gsLst>
-            <a:path path="circle">
-              <a:fillToRect t="100000" r="100000"/>
-            </a:path>
-            <a:tileRect l="-100000" b="-100000"/>
-          </a:gradFill>
-        </p:spPr>
-        <p:txBody>
-          <a:bodyPr vert="horz" lIns="91440" tIns="45720" rIns="91440" bIns="45720" rtlCol="0" anchor="ctr">
-            <a:normAutofit fontScale="92500"/>
-          </a:bodyPr>
-          <a:lstStyle/>
-          <a:p>
-            <a:pPr lvl="0">
-              <a:spcBef>
-                <a:spcPct val="0"/>
-              </a:spcBef>
-            </a:pPr>
-            <a:r>
-              <a:rPr lang="en-US" altLang="zh-TW" sz="1600" dirty="0">
-                <a:latin typeface="+mj-lt"/>
-                <a:ea typeface="+mj-ea"/>
-                <a:cs typeface="+mj-cs"/>
-              </a:rPr>
-              <a:t>https://www.youtube.com/watch?v=HhrQqmp3hXI&amp;list=PLsyeobzWxl7oZ-fxDYkOToURHhMuWD1BK&amp;index=133</a:t>
-            </a:r>
-            <a:endParaRPr kumimoji="0" lang="zh-TW" altLang="en-US" sz="1600" b="0" i="0" u="none" strike="noStrike" kern="1200" cap="none" spc="0" normalizeH="0" baseline="0" noProof="0" dirty="0">
-              <a:ln>
-                <a:noFill/>
-              </a:ln>
-              <a:solidFill>
-                <a:schemeClr val="tx1"/>
-              </a:solidFill>
-              <a:effectLst/>
-              <a:uLnTx/>
-              <a:uFillTx/>
-              <a:latin typeface="+mj-lt"/>
-              <a:ea typeface="+mj-ea"/>
-              <a:cs typeface="+mj-cs"/>
-            </a:endParaRPr>
-          </a:p>
-        </p:txBody>
-      </p:sp>
-      <p:sp>
-        <p:nvSpPr>
-          <p:cNvPr id="5" name="日期版面配置區 4"/>
-          <p:cNvSpPr>
-            <a:spLocks noGrp="1"/>
-          </p:cNvSpPr>
-          <p:nvPr>
-            <p:ph type="dt" sz="half" idx="10"/>
-          </p:nvPr>
-        </p:nvSpPr>
-        <p:spPr/>
-        <p:txBody>
-          <a:bodyPr/>
-          <a:lstStyle/>
-          <a:p>
-            <a:fld id="{A4F910E6-8D00-4BAF-8C48-9688E0B449D3}" type="datetime1">
-              <a:rPr lang="zh-TW" altLang="en-US" smtClean="0"/>
-              <a:pPr/>
-              <a:t>2019/3/20</a:t>
-            </a:fld>
-            <a:endParaRPr lang="zh-TW" altLang="en-US"/>
-          </a:p>
-        </p:txBody>
-      </p:sp>
-      <p:sp>
-        <p:nvSpPr>
-          <p:cNvPr id="6" name="投影片編號版面配置區 5"/>
-          <p:cNvSpPr>
-            <a:spLocks noGrp="1"/>
-          </p:cNvSpPr>
-          <p:nvPr>
-            <p:ph type="sldNum" sz="quarter" idx="12"/>
-          </p:nvPr>
-        </p:nvSpPr>
-        <p:spPr/>
-        <p:txBody>
-          <a:bodyPr/>
-          <a:lstStyle/>
-          <a:p>
-            <a:fld id="{E4D7E63D-91F2-4366-A2C4-1B00C9E2590E}" type="slidenum">
-              <a:rPr lang="zh-TW" altLang="en-US" smtClean="0"/>
-              <a:pPr/>
-              <a:t>6</a:t>
-            </a:fld>
-            <a:endParaRPr lang="zh-TW" altLang="en-US"/>
-          </a:p>
-        </p:txBody>
-      </p:sp>
       <p:pic>
         <p:nvPicPr>
           <p:cNvPr id="128" name="Picture 127">
@@ -9163,7 +6368,7 @@
 </p:sld>
 </file>
 
-<file path=ppt/slides/slide7.xml><?xml version="1.0" encoding="utf-8"?>
+<file path=ppt/slides/slide6.xml><?xml version="1.0" encoding="utf-8"?>
 <p:sld xmlns:a="http://schemas.openxmlformats.org/drawingml/2006/main" xmlns:r="http://schemas.openxmlformats.org/officeDocument/2006/relationships" xmlns:p="http://schemas.openxmlformats.org/presentationml/2006/main">
   <p:cSld>
     <p:spTree>
@@ -9483,7 +6688,7 @@
             <a:fld id="{E4D7E63D-91F2-4366-A2C4-1B00C9E2590E}" type="slidenum">
               <a:rPr lang="zh-TW" altLang="en-US" smtClean="0"/>
               <a:pPr/>
-              <a:t>7</a:t>
+              <a:t>6</a:t>
             </a:fld>
             <a:endParaRPr lang="zh-TW" altLang="en-US"/>
           </a:p>
@@ -9600,7 +6805,7 @@
 </p:sld>
 </file>
 
-<file path=ppt/slides/slide8.xml><?xml version="1.0" encoding="utf-8"?>
+<file path=ppt/slides/slide7.xml><?xml version="1.0" encoding="utf-8"?>
 <p:sld xmlns:a="http://schemas.openxmlformats.org/drawingml/2006/main" xmlns:r="http://schemas.openxmlformats.org/officeDocument/2006/relationships" xmlns:p="http://schemas.openxmlformats.org/presentationml/2006/main">
   <p:cSld>
     <p:spTree>
@@ -9730,7 +6935,7 @@
             <a:fld id="{E4D7E63D-91F2-4366-A2C4-1B00C9E2590E}" type="slidenum">
               <a:rPr lang="zh-TW" altLang="en-US" smtClean="0"/>
               <a:pPr/>
-              <a:t>8</a:t>
+              <a:t>7</a:t>
             </a:fld>
             <a:endParaRPr lang="zh-TW" altLang="en-US"/>
           </a:p>
@@ -9781,7 +6986,7 @@
 </p:sld>
 </file>
 
-<file path=ppt/slides/slide9.xml><?xml version="1.0" encoding="utf-8"?>
+<file path=ppt/slides/slide8.xml><?xml version="1.0" encoding="utf-8"?>
 <p:sld xmlns:a="http://schemas.openxmlformats.org/drawingml/2006/main" xmlns:r="http://schemas.openxmlformats.org/officeDocument/2006/relationships" xmlns:p="http://schemas.openxmlformats.org/presentationml/2006/main">
   <p:cSld>
     <p:spTree>
@@ -10100,7 +7305,7 @@
             <a:fld id="{E4D7E63D-91F2-4366-A2C4-1B00C9E2590E}" type="slidenum">
               <a:rPr lang="zh-TW" altLang="en-US" smtClean="0"/>
               <a:pPr/>
-              <a:t>9</a:t>
+              <a:t>8</a:t>
             </a:fld>
             <a:endParaRPr lang="zh-TW" altLang="en-US"/>
           </a:p>
@@ -10208,6 +7413,439 @@
     <p:extLst>
       <p:ext uri="{BB962C8B-B14F-4D97-AF65-F5344CB8AC3E}">
         <p14:creationId xmlns:p14="http://schemas.microsoft.com/office/powerpoint/2010/main" val="835777521"/>
+      </p:ext>
+    </p:extLst>
+  </p:cSld>
+  <p:clrMapOvr>
+    <a:masterClrMapping/>
+  </p:clrMapOvr>
+</p:sld>
+</file>
+
+<file path=ppt/slides/slide9.xml><?xml version="1.0" encoding="utf-8"?>
+<p:sld xmlns:a="http://schemas.openxmlformats.org/drawingml/2006/main" xmlns:r="http://schemas.openxmlformats.org/officeDocument/2006/relationships" xmlns:p="http://schemas.openxmlformats.org/presentationml/2006/main">
+  <p:cSld>
+    <p:spTree>
+      <p:nvGrpSpPr>
+        <p:cNvPr id="1" name=""/>
+        <p:cNvGrpSpPr/>
+        <p:nvPr/>
+      </p:nvGrpSpPr>
+      <p:grpSpPr>
+        <a:xfrm>
+          <a:off x="0" y="0"/>
+          <a:ext cx="0" cy="0"/>
+          <a:chOff x="0" y="0"/>
+          <a:chExt cx="0" cy="0"/>
+        </a:xfrm>
+      </p:grpSpPr>
+      <p:pic>
+        <p:nvPicPr>
+          <p:cNvPr id="7" name="Picture 6">
+            <a:extLst>
+              <a:ext uri="{FF2B5EF4-FFF2-40B4-BE49-F238E27FC236}">
+                <a16:creationId xmlns:a16="http://schemas.microsoft.com/office/drawing/2014/main" id="{C5E29281-308C-44D3-8E4A-AB074B879039}"/>
+              </a:ext>
+            </a:extLst>
+          </p:cNvPr>
+          <p:cNvPicPr>
+            <a:picLocks noChangeAspect="1"/>
+          </p:cNvPicPr>
+          <p:nvPr/>
+        </p:nvPicPr>
+        <p:blipFill>
+          <a:blip r:embed="rId2"/>
+          <a:stretch>
+            <a:fillRect/>
+          </a:stretch>
+        </p:blipFill>
+        <p:spPr>
+          <a:xfrm>
+            <a:off x="2051720" y="1882376"/>
+            <a:ext cx="3852428" cy="4669110"/>
+          </a:xfrm>
+          <a:prstGeom prst="rect">
+            <a:avLst/>
+          </a:prstGeom>
+          <a:ln>
+            <a:solidFill>
+              <a:srgbClr val="C00000"/>
+            </a:solidFill>
+          </a:ln>
+        </p:spPr>
+      </p:pic>
+      <p:sp>
+        <p:nvSpPr>
+          <p:cNvPr id="2" name="標題 1"/>
+          <p:cNvSpPr>
+            <a:spLocks noGrp="1"/>
+          </p:cNvSpPr>
+          <p:nvPr>
+            <p:ph type="ctrTitle"/>
+          </p:nvPr>
+        </p:nvSpPr>
+        <p:spPr>
+          <a:xfrm>
+            <a:off x="0" y="1"/>
+            <a:ext cx="9144000" cy="764704"/>
+          </a:xfrm>
+          <a:gradFill flip="none" rotWithShape="1">
+            <a:gsLst>
+              <a:gs pos="0">
+                <a:srgbClr val="C00000">
+                  <a:shade val="30000"/>
+                  <a:satMod val="115000"/>
+                </a:srgbClr>
+              </a:gs>
+              <a:gs pos="50000">
+                <a:srgbClr val="C00000">
+                  <a:shade val="67500"/>
+                  <a:satMod val="115000"/>
+                </a:srgbClr>
+              </a:gs>
+              <a:gs pos="100000">
+                <a:srgbClr val="C00000">
+                  <a:shade val="100000"/>
+                  <a:satMod val="115000"/>
+                </a:srgbClr>
+              </a:gs>
+            </a:gsLst>
+            <a:path path="circle">
+              <a:fillToRect t="100000" r="100000"/>
+            </a:path>
+            <a:tileRect l="-100000" b="-100000"/>
+          </a:gradFill>
+        </p:spPr>
+        <p:txBody>
+          <a:bodyPr>
+            <a:normAutofit/>
+          </a:bodyPr>
+          <a:lstStyle/>
+          <a:p>
+            <a:pPr algn="l"/>
+            <a:r>
+              <a:rPr lang="en-US" altLang="zh-TW" b="1" dirty="0">
+                <a:solidFill>
+                  <a:srgbClr val="FFFF00"/>
+                </a:solidFill>
+              </a:rPr>
+              <a:t>14.02.01 Loop Objects by Iterator</a:t>
+            </a:r>
+            <a:endParaRPr lang="zh-TW" altLang="en-US" b="1" dirty="0">
+              <a:solidFill>
+                <a:srgbClr val="FFFF00"/>
+              </a:solidFill>
+            </a:endParaRPr>
+          </a:p>
+        </p:txBody>
+      </p:sp>
+      <p:sp>
+        <p:nvSpPr>
+          <p:cNvPr id="3" name="副標題 2"/>
+          <p:cNvSpPr>
+            <a:spLocks noGrp="1"/>
+          </p:cNvSpPr>
+          <p:nvPr>
+            <p:ph type="subTitle" idx="1"/>
+          </p:nvPr>
+        </p:nvSpPr>
+        <p:spPr>
+          <a:xfrm>
+            <a:off x="467544" y="1268760"/>
+            <a:ext cx="8352928" cy="469600"/>
+          </a:xfrm>
+          <a:ln>
+            <a:solidFill>
+              <a:srgbClr val="C00000"/>
+            </a:solidFill>
+          </a:ln>
+        </p:spPr>
+        <p:txBody>
+          <a:bodyPr>
+            <a:noAutofit/>
+          </a:bodyPr>
+          <a:lstStyle/>
+          <a:p>
+            <a:pPr marL="342900" indent="-342900" algn="l">
+              <a:buClr>
+                <a:srgbClr val="0070C0"/>
+              </a:buClr>
+              <a:buSzPct val="80000"/>
+              <a:buFont typeface="Wingdings" pitchFamily="2" charset="2"/>
+              <a:buChar char="u"/>
+            </a:pPr>
+            <a:r>
+              <a:rPr lang="en-US" altLang="zh-TW" sz="1600" dirty="0">
+                <a:solidFill>
+                  <a:schemeClr val="tx1"/>
+                </a:solidFill>
+              </a:rPr>
+              <a:t>Use while (</a:t>
+            </a:r>
+            <a:r>
+              <a:rPr lang="en-US" altLang="zh-TW" sz="1600" dirty="0" err="1">
+                <a:solidFill>
+                  <a:schemeClr val="tx1"/>
+                </a:solidFill>
+              </a:rPr>
+              <a:t>i.hasNext</a:t>
+            </a:r>
+            <a:r>
+              <a:rPr lang="en-US" altLang="zh-TW" sz="1600" dirty="0">
+                <a:solidFill>
+                  <a:schemeClr val="tx1"/>
+                </a:solidFill>
+              </a:rPr>
+              <a:t>()) to loop all the elements and print with </a:t>
+            </a:r>
+            <a:r>
+              <a:rPr lang="en-US" altLang="zh-TW" sz="1600" dirty="0" err="1">
+                <a:solidFill>
+                  <a:schemeClr val="tx1"/>
+                </a:solidFill>
+              </a:rPr>
+              <a:t>i.next</a:t>
+            </a:r>
+            <a:r>
+              <a:rPr lang="en-US" altLang="zh-TW" sz="1600" dirty="0">
+                <a:solidFill>
+                  <a:schemeClr val="tx1"/>
+                </a:solidFill>
+              </a:rPr>
+              <a:t>().</a:t>
+            </a:r>
+          </a:p>
+        </p:txBody>
+      </p:sp>
+      <p:sp>
+        <p:nvSpPr>
+          <p:cNvPr id="4" name="標題 1"/>
+          <p:cNvSpPr txBox="1">
+            <a:spLocks/>
+          </p:cNvSpPr>
+          <p:nvPr/>
+        </p:nvSpPr>
+        <p:spPr>
+          <a:xfrm>
+            <a:off x="0" y="764704"/>
+            <a:ext cx="9144000" cy="360040"/>
+          </a:xfrm>
+          <a:prstGeom prst="rect">
+            <a:avLst/>
+          </a:prstGeom>
+          <a:gradFill flip="none" rotWithShape="1">
+            <a:gsLst>
+              <a:gs pos="0">
+                <a:srgbClr val="00B0F0">
+                  <a:shade val="30000"/>
+                  <a:satMod val="115000"/>
+                </a:srgbClr>
+              </a:gs>
+              <a:gs pos="50000">
+                <a:srgbClr val="00B0F0">
+                  <a:shade val="67500"/>
+                  <a:satMod val="115000"/>
+                </a:srgbClr>
+              </a:gs>
+              <a:gs pos="100000">
+                <a:srgbClr val="00B0F0">
+                  <a:shade val="100000"/>
+                  <a:satMod val="115000"/>
+                </a:srgbClr>
+              </a:gs>
+            </a:gsLst>
+            <a:path path="circle">
+              <a:fillToRect t="100000" r="100000"/>
+            </a:path>
+            <a:tileRect l="-100000" b="-100000"/>
+          </a:gradFill>
+        </p:spPr>
+        <p:txBody>
+          <a:bodyPr vert="horz" lIns="91440" tIns="45720" rIns="91440" bIns="45720" rtlCol="0" anchor="ctr">
+            <a:normAutofit fontScale="92500"/>
+          </a:bodyPr>
+          <a:lstStyle/>
+          <a:p>
+            <a:pPr lvl="0">
+              <a:spcBef>
+                <a:spcPct val="0"/>
+              </a:spcBef>
+            </a:pPr>
+            <a:r>
+              <a:rPr lang="en-US" altLang="zh-TW" sz="1600" dirty="0">
+                <a:latin typeface="+mj-lt"/>
+                <a:ea typeface="+mj-ea"/>
+                <a:cs typeface="+mj-cs"/>
+              </a:rPr>
+              <a:t>https://www.youtube.com/watch?v=HhrQqmp3hXI&amp;list=PLsyeobzWxl7oZ-fxDYkOToURHhMuWD1BK&amp;index=133</a:t>
+            </a:r>
+            <a:endParaRPr kumimoji="0" lang="zh-TW" altLang="en-US" sz="1600" b="0" i="0" u="none" strike="noStrike" kern="1200" cap="none" spc="0" normalizeH="0" baseline="0" noProof="0" dirty="0">
+              <a:ln>
+                <a:noFill/>
+              </a:ln>
+              <a:solidFill>
+                <a:schemeClr val="tx1"/>
+              </a:solidFill>
+              <a:effectLst/>
+              <a:uLnTx/>
+              <a:uFillTx/>
+              <a:latin typeface="+mj-lt"/>
+              <a:ea typeface="+mj-ea"/>
+              <a:cs typeface="+mj-cs"/>
+            </a:endParaRPr>
+          </a:p>
+        </p:txBody>
+      </p:sp>
+      <p:sp>
+        <p:nvSpPr>
+          <p:cNvPr id="5" name="日期版面配置區 4"/>
+          <p:cNvSpPr>
+            <a:spLocks noGrp="1"/>
+          </p:cNvSpPr>
+          <p:nvPr>
+            <p:ph type="dt" sz="half" idx="10"/>
+          </p:nvPr>
+        </p:nvSpPr>
+        <p:spPr/>
+        <p:txBody>
+          <a:bodyPr/>
+          <a:lstStyle/>
+          <a:p>
+            <a:fld id="{A4F910E6-8D00-4BAF-8C48-9688E0B449D3}" type="datetime1">
+              <a:rPr lang="zh-TW" altLang="en-US" smtClean="0"/>
+              <a:pPr/>
+              <a:t>2019/3/20</a:t>
+            </a:fld>
+            <a:endParaRPr lang="zh-TW" altLang="en-US"/>
+          </a:p>
+        </p:txBody>
+      </p:sp>
+      <p:sp>
+        <p:nvSpPr>
+          <p:cNvPr id="6" name="投影片編號版面配置區 5"/>
+          <p:cNvSpPr>
+            <a:spLocks noGrp="1"/>
+          </p:cNvSpPr>
+          <p:nvPr>
+            <p:ph type="sldNum" sz="quarter" idx="12"/>
+          </p:nvPr>
+        </p:nvSpPr>
+        <p:spPr/>
+        <p:txBody>
+          <a:bodyPr/>
+          <a:lstStyle/>
+          <a:p>
+            <a:fld id="{E4D7E63D-91F2-4366-A2C4-1B00C9E2590E}" type="slidenum">
+              <a:rPr lang="zh-TW" altLang="en-US" smtClean="0"/>
+              <a:pPr/>
+              <a:t>9</a:t>
+            </a:fld>
+            <a:endParaRPr lang="zh-TW" altLang="en-US"/>
+          </a:p>
+        </p:txBody>
+      </p:sp>
+      <p:sp>
+        <p:nvSpPr>
+          <p:cNvPr id="129" name="Rectangle 128">
+            <a:extLst>
+              <a:ext uri="{FF2B5EF4-FFF2-40B4-BE49-F238E27FC236}">
+                <a16:creationId xmlns:a16="http://schemas.microsoft.com/office/drawing/2014/main" id="{9F68A035-546B-4E11-ADFC-7FBDDAC42022}"/>
+              </a:ext>
+            </a:extLst>
+          </p:cNvPr>
+          <p:cNvSpPr/>
+          <p:nvPr/>
+        </p:nvSpPr>
+        <p:spPr>
+          <a:xfrm>
+            <a:off x="2771800" y="4581128"/>
+            <a:ext cx="2304256" cy="576064"/>
+          </a:xfrm>
+          <a:prstGeom prst="rect">
+            <a:avLst/>
+          </a:prstGeom>
+          <a:noFill/>
+          <a:ln>
+            <a:solidFill>
+              <a:srgbClr val="C00000"/>
+            </a:solidFill>
+          </a:ln>
+        </p:spPr>
+        <p:style>
+          <a:lnRef idx="2">
+            <a:schemeClr val="accent1">
+              <a:shade val="50000"/>
+            </a:schemeClr>
+          </a:lnRef>
+          <a:fillRef idx="1">
+            <a:schemeClr val="accent1"/>
+          </a:fillRef>
+          <a:effectRef idx="0">
+            <a:schemeClr val="accent1"/>
+          </a:effectRef>
+          <a:fontRef idx="minor">
+            <a:schemeClr val="lt1"/>
+          </a:fontRef>
+        </p:style>
+        <p:txBody>
+          <a:bodyPr rtlCol="0" anchor="ctr"/>
+          <a:lstStyle/>
+          <a:p>
+            <a:pPr algn="ctr"/>
+            <a:endParaRPr lang="en-US"/>
+          </a:p>
+        </p:txBody>
+      </p:sp>
+      <p:cxnSp>
+        <p:nvCxnSpPr>
+          <p:cNvPr id="131" name="Straight Arrow Connector 130">
+            <a:extLst>
+              <a:ext uri="{FF2B5EF4-FFF2-40B4-BE49-F238E27FC236}">
+                <a16:creationId xmlns:a16="http://schemas.microsoft.com/office/drawing/2014/main" id="{70BAF35F-69E8-4346-86B2-726DF28197E9}"/>
+              </a:ext>
+            </a:extLst>
+          </p:cNvPr>
+          <p:cNvCxnSpPr>
+            <a:cxnSpLocks/>
+            <a:stCxn id="3" idx="2"/>
+            <a:endCxn id="129" idx="0"/>
+          </p:cNvCxnSpPr>
+          <p:nvPr/>
+        </p:nvCxnSpPr>
+        <p:spPr>
+          <a:xfrm flipH="1">
+            <a:off x="3923928" y="1738360"/>
+            <a:ext cx="720080" cy="2842768"/>
+          </a:xfrm>
+          <a:prstGeom prst="straightConnector1">
+            <a:avLst/>
+          </a:prstGeom>
+          <a:ln>
+            <a:solidFill>
+              <a:srgbClr val="C00000"/>
+            </a:solidFill>
+            <a:tailEnd type="triangle"/>
+          </a:ln>
+        </p:spPr>
+        <p:style>
+          <a:lnRef idx="1">
+            <a:schemeClr val="accent1"/>
+          </a:lnRef>
+          <a:fillRef idx="0">
+            <a:schemeClr val="accent1"/>
+          </a:fillRef>
+          <a:effectRef idx="0">
+            <a:schemeClr val="accent1"/>
+          </a:effectRef>
+          <a:fontRef idx="minor">
+            <a:schemeClr val="tx1"/>
+          </a:fontRef>
+        </p:style>
+      </p:cxnSp>
+    </p:spTree>
+    <p:extLst>
+      <p:ext uri="{BB962C8B-B14F-4D97-AF65-F5344CB8AC3E}">
+        <p14:creationId xmlns:p14="http://schemas.microsoft.com/office/powerpoint/2010/main" val="166083836"/>
       </p:ext>
     </p:extLst>
   </p:cSld>

</xml_diff>